<commit_message>
bug fixes for NOAA tutorial
Fixed my name on intro-a

Updated links to Flasxh-X docs on documentation
</commit_message>
<xml_diff>
--- a/intro-a.pptx
+++ b/intro-a.pptx
@@ -266,7 +266,7 @@
           <a:p>
             <a:fld id="{0B842F42-2CE9-4E35-95C1-410DC08A50B1}" type="datetimeFigureOut">
               <a:rPr lang="en-US" smtClean="0"/>
-              <a:t>7/27/2023</a:t>
+              <a:t>7/30/2023</a:t>
             </a:fld>
             <a:endParaRPr lang="en-US"/>
           </a:p>
@@ -431,7 +431,7 @@
           <a:p>
             <a:fld id="{6F282904-F315-4730-8D91-37D99E141A6F}" type="datetimeFigureOut">
               <a:rPr lang="en-US" smtClean="0"/>
-              <a:t>7/27/2023</a:t>
+              <a:t>7/30/2023</a:t>
             </a:fld>
             <a:endParaRPr lang="en-US"/>
           </a:p>
@@ -4126,15 +4126,7 @@
           <a:p>
             <a:r>
               <a:rPr lang="en-US" dirty="0"/>
-              <a:t>David E. </a:t>
-            </a:r>
-            <a:r>
-              <a:rPr lang="en-US" dirty="0" err="1"/>
-              <a:t>Berholdt</a:t>
-            </a:r>
-            <a:r>
-              <a:rPr lang="en-US" dirty="0"/>
-              <a:t>, Anshu Dubey, and Patricia A. Grubel</a:t>
+              <a:t>David E. Bernholdt, Anshu Dubey, and Patricia A. Grubel</a:t>
             </a:r>
           </a:p>
           <a:p>
@@ -13420,18 +13412,18 @@
 </file>
 
 <file path=customXml/item1.xml><?xml version="1.0" encoding="utf-8"?>
+<p:properties xmlns:p="http://schemas.microsoft.com/office/2006/metadata/properties" xmlns:xsi="http://www.w3.org/2001/XMLSchema-instance" xmlns:pc="http://schemas.microsoft.com/office/infopath/2007/PartnerControls">
+  <documentManagement/>
+</p:properties>
+</file>
+
+<file path=customXml/item2.xml><?xml version="1.0" encoding="utf-8"?>
 <?mso-contentType ?>
 <FormTemplates xmlns="http://schemas.microsoft.com/sharepoint/v3/contenttype/forms">
   <Display>DocumentLibraryForm</Display>
   <Edit>DocumentLibraryForm</Edit>
   <New>DocumentLibraryForm</New>
 </FormTemplates>
-</file>
-
-<file path=customXml/item2.xml><?xml version="1.0" encoding="utf-8"?>
-<p:properties xmlns:p="http://schemas.microsoft.com/office/2006/metadata/properties" xmlns:xsi="http://www.w3.org/2001/XMLSchema-instance" xmlns:pc="http://schemas.microsoft.com/office/infopath/2007/PartnerControls">
-  <documentManagement/>
-</p:properties>
 </file>
 
 <file path=customXml/item3.xml><?xml version="1.0" encoding="utf-8"?>
@@ -13484,14 +13476,6 @@
 </file>
 
 <file path=customXml/itemProps1.xml><?xml version="1.0" encoding="utf-8"?>
-<ds:datastoreItem xmlns:ds="http://schemas.openxmlformats.org/officeDocument/2006/customXml" ds:itemID="{19E20559-B232-4371-8690-E3D8007EDB82}">
-  <ds:schemaRefs>
-    <ds:schemaRef ds:uri="http://schemas.microsoft.com/sharepoint/v3/contenttype/forms"/>
-  </ds:schemaRefs>
-</ds:datastoreItem>
-</file>
-
-<file path=customXml/itemProps2.xml><?xml version="1.0" encoding="utf-8"?>
 <ds:datastoreItem xmlns:ds="http://schemas.openxmlformats.org/officeDocument/2006/customXml" ds:itemID="{A50EC660-24D0-43A0-AE5E-E274115E726B}">
   <ds:schemaRefs>
     <ds:schemaRef ds:uri="http://purl.org/dc/elements/1.1/"/>
@@ -13502,6 +13486,14 @@
     <ds:schemaRef ds:uri="http://www.w3.org/XML/1998/namespace"/>
     <ds:schemaRef ds:uri="http://purl.org/dc/dcmitype/"/>
     <ds:schemaRef ds:uri="http://schemas.microsoft.com/office/infopath/2007/PartnerControls"/>
+  </ds:schemaRefs>
+</ds:datastoreItem>
+</file>
+
+<file path=customXml/itemProps2.xml><?xml version="1.0" encoding="utf-8"?>
+<ds:datastoreItem xmlns:ds="http://schemas.openxmlformats.org/officeDocument/2006/customXml" ds:itemID="{19E20559-B232-4371-8690-E3D8007EDB82}">
+  <ds:schemaRefs>
+    <ds:schemaRef ds:uri="http://schemas.microsoft.com/sharepoint/v3/contenttype/forms"/>
   </ds:schemaRefs>
 </ds:datastoreItem>
 </file>

</xml_diff>

<commit_message>
Partial prep for ACM-REP tutorial
</commit_message>
<xml_diff>
--- a/intro-a.pptx
+++ b/intro-a.pptx
@@ -12,7 +12,7 @@
   </p:handoutMasterIdLst>
   <p:sldIdLst>
     <p:sldId id="617" r:id="rId5"/>
-    <p:sldId id="320" r:id="rId6"/>
+    <p:sldId id="623" r:id="rId6"/>
     <p:sldId id="308" r:id="rId7"/>
     <p:sldId id="324" r:id="rId8"/>
     <p:sldId id="329" r:id="rId9"/>
@@ -264,7 +264,7 @@
           <a:p>
             <a:fld id="{0B842F42-2CE9-4E35-95C1-410DC08A50B1}" type="datetimeFigureOut">
               <a:rPr lang="en-US" smtClean="0"/>
-              <a:t>4/28/2024</a:t>
+              <a:t>6/11/2024</a:t>
             </a:fld>
             <a:endParaRPr lang="en-US"/>
           </a:p>
@@ -429,7 +429,7 @@
           <a:p>
             <a:fld id="{6F282904-F315-4730-8D91-37D99E141A6F}" type="datetimeFigureOut">
               <a:rPr lang="en-US" smtClean="0"/>
-              <a:t>4/28/2024</a:t>
+              <a:t>6/11/2024</a:t>
             </a:fld>
             <a:endParaRPr lang="en-US"/>
           </a:p>
@@ -4214,15 +4214,9 @@
               </a:spcBef>
             </a:pPr>
             <a:r>
-              <a:rPr lang="en-US" i="0" dirty="0">
-                <a:solidFill>
-                  <a:srgbClr val="111111"/>
-                </a:solidFill>
-                <a:effectLst/>
-              </a:rPr>
-              <a:t>Better Scientific Software</a:t>
-            </a:r>
-            <a:endParaRPr lang="en-US" dirty="0"/>
+              <a:rPr lang="en-US" dirty="0"/>
+              <a:t>Software Practices for Reproducible Science</a:t>
+            </a:r>
           </a:p>
         </p:txBody>
       </p:sp>
@@ -4254,7 +4248,7 @@
           <a:p>
             <a:r>
               <a:rPr lang="en-US" dirty="0"/>
-              <a:t>Anshu Dubey</a:t>
+              <a:t>Anshu Dubey and Gregory R. Watson</a:t>
             </a:r>
           </a:p>
           <a:p>
@@ -4264,10 +4258,17 @@
                   <a:srgbClr val="111111"/>
                 </a:solidFill>
                 <a:effectLst/>
-                <a:latin typeface="+mn-lt"/>
+                <a:latin typeface="-apple-system"/>
               </a:rPr>
-              <a:t>Better Scientific Software tutorial @ ISC24</a:t>
-            </a:r>
+              <a:t>2024 ACM Conference on Reproducibility and Replicability (ACM-REP)</a:t>
+            </a:r>
+            <a:endParaRPr lang="en-US" b="0" i="0" dirty="0">
+              <a:solidFill>
+                <a:srgbClr val="111111"/>
+              </a:solidFill>
+              <a:effectLst/>
+              <a:latin typeface="+mn-lt"/>
+            </a:endParaRPr>
           </a:p>
         </p:txBody>
       </p:sp>
@@ -4409,14 +4410,14 @@
             <p:ph idx="1"/>
             <p:extLst>
               <p:ext uri="{D42A27DB-BD31-4B8C-83A1-F6EECF244321}">
-                <p14:modId xmlns:p14="http://schemas.microsoft.com/office/powerpoint/2010/main" val="1542722887"/>
+                <p14:modId xmlns:p14="http://schemas.microsoft.com/office/powerpoint/2010/main" val="1181368582"/>
               </p:ext>
             </p:extLst>
           </p:nvPr>
         </p:nvGraphicFramePr>
         <p:xfrm>
           <a:off x="1051560" y="1074420"/>
-          <a:ext cx="9692640" cy="5478018"/>
+          <a:ext cx="9692640" cy="4424934"/>
         </p:xfrm>
         <a:graphic>
           <a:graphicData uri="http://schemas.openxmlformats.org/drawingml/2006/table">
@@ -4486,10 +4487,10 @@
                     <a:p>
                       <a:pPr algn="r"/>
                       <a:r>
-                        <a:rPr lang="en-US" sz="1800" dirty="0">
+                        <a:rPr lang="en-US">
                           <a:effectLst/>
                         </a:rPr>
-                        <a:t>2:00 PM</a:t>
+                        <a:t>1:30 PM</a:t>
                       </a:r>
                     </a:p>
                   </a:txBody>
@@ -4501,48 +4502,10 @@
                     <a:lstStyle/>
                     <a:p>
                       <a:r>
-                        <a:rPr lang="en-US" sz="1800" dirty="0">
+                        <a:rPr lang="en-US" dirty="0">
                           <a:effectLst/>
                         </a:rPr>
                         <a:t>Introduction</a:t>
-                      </a:r>
-                    </a:p>
-                  </a:txBody>
-                  <a:tcPr marL="142875" marR="142875" marT="95250" marB="95250" anchor="ctr"/>
-                </a:tc>
-                <a:extLst>
-                  <a:ext uri="{0D108BD9-81ED-4DB2-BD59-A6C34878D82A}">
-                    <a16:rowId xmlns:a16="http://schemas.microsoft.com/office/drawing/2014/main" val="1592907298"/>
-                  </a:ext>
-                </a:extLst>
-              </a:tr>
-              <a:tr h="526542">
-                <a:tc>
-                  <a:txBody>
-                    <a:bodyPr/>
-                    <a:lstStyle/>
-                    <a:p>
-                      <a:pPr algn="r"/>
-                      <a:r>
-                        <a:rPr lang="en-US" sz="1800" dirty="0">
-                          <a:effectLst/>
-                        </a:rPr>
-                        <a:t>2:05 PM</a:t>
-                      </a:r>
-                    </a:p>
-                  </a:txBody>
-                  <a:tcPr marL="142875" marR="142875" marT="95250" marB="95250" anchor="ctr"/>
-                </a:tc>
-                <a:tc>
-                  <a:txBody>
-                    <a:bodyPr/>
-                    <a:lstStyle/>
-                    <a:p>
-                      <a:r>
-                        <a:rPr lang="en-US" sz="1800" dirty="0">
-                          <a:effectLst/>
-                        </a:rPr>
-                        <a:t>Motivation and Overview of Best Practices in HPC Software Development</a:t>
                       </a:r>
                     </a:p>
                   </a:txBody>
@@ -4562,10 +4525,10 @@
                     <a:p>
                       <a:pPr algn="r"/>
                       <a:r>
-                        <a:rPr lang="en-US" sz="1800" dirty="0">
+                        <a:rPr lang="en-US">
                           <a:effectLst/>
                         </a:rPr>
-                        <a:t>2:20 PM</a:t>
+                        <a:t>1:35 PM</a:t>
                       </a:r>
                     </a:p>
                   </a:txBody>
@@ -4577,10 +4540,10 @@
                     <a:lstStyle/>
                     <a:p>
                       <a:r>
-                        <a:rPr lang="en-US" sz="1800" dirty="0">
+                        <a:rPr lang="en-US">
                           <a:effectLst/>
                         </a:rPr>
-                        <a:t>Scientific Software Design</a:t>
+                        <a:t>Improving Reproducibility Through Better Software Practices</a:t>
                       </a:r>
                     </a:p>
                   </a:txBody>
@@ -4600,10 +4563,10 @@
                     <a:p>
                       <a:pPr algn="r"/>
                       <a:r>
-                        <a:rPr lang="en-US" sz="1800" dirty="0">
+                        <a:rPr lang="en-US">
                           <a:effectLst/>
                         </a:rPr>
-                        <a:t>2:50 PM</a:t>
+                        <a:t>2:15 PM</a:t>
                       </a:r>
                     </a:p>
                   </a:txBody>
@@ -4615,7 +4578,7 @@
                     <a:lstStyle/>
                     <a:p>
                       <a:r>
-                        <a:rPr lang="en-US" sz="1800" i="0" dirty="0">
+                        <a:rPr lang="en-US">
                           <a:effectLst/>
                         </a:rPr>
                         <a:t>Software Testing and Verification</a:t>
@@ -4638,10 +4601,10 @@
                     <a:p>
                       <a:pPr algn="r"/>
                       <a:r>
-                        <a:rPr lang="en-US" sz="1800" dirty="0">
+                        <a:rPr lang="en-US">
                           <a:effectLst/>
                         </a:rPr>
-                        <a:t>3:30 PM</a:t>
+                        <a:t>3:00 PM</a:t>
                       </a:r>
                     </a:p>
                   </a:txBody>
@@ -4653,11 +4616,14 @@
                     <a:lstStyle/>
                     <a:p>
                       <a:r>
-                        <a:rPr lang="en-US" sz="1800" dirty="0">
+                        <a:rPr lang="en-US" i="1">
                           <a:effectLst/>
                         </a:rPr>
-                        <a:t>Refactoring Scientific Software</a:t>
+                        <a:t>Afternoon break</a:t>
                       </a:r>
+                      <a:endParaRPr lang="en-US">
+                        <a:effectLst/>
+                      </a:endParaRPr>
                     </a:p>
                   </a:txBody>
                   <a:tcPr marL="142875" marR="142875" marT="95250" marB="95250" anchor="ctr"/>
@@ -4676,10 +4642,10 @@
                     <a:p>
                       <a:pPr algn="r"/>
                       <a:r>
-                        <a:rPr lang="en-US" sz="1800" dirty="0">
+                        <a:rPr lang="en-US">
                           <a:effectLst/>
                         </a:rPr>
-                        <a:t>4:00 PM</a:t>
+                        <a:t>3:30 PM</a:t>
                       </a:r>
                     </a:p>
                   </a:txBody>
@@ -4691,10 +4657,10 @@
                     <a:lstStyle/>
                     <a:p>
                       <a:r>
-                        <a:rPr lang="en-US" sz="1800" i="1" dirty="0">
+                        <a:rPr lang="en-US">
                           <a:effectLst/>
                         </a:rPr>
-                        <a:t>Break</a:t>
+                        <a:t>Managing Computational Experiments</a:t>
                       </a:r>
                     </a:p>
                   </a:txBody>
@@ -4714,7 +4680,7 @@
                     <a:p>
                       <a:pPr algn="r"/>
                       <a:r>
-                        <a:rPr lang="en-US" sz="1800" dirty="0">
+                        <a:rPr lang="en-US">
                           <a:effectLst/>
                         </a:rPr>
                         <a:t>4:30 PM</a:t>
@@ -4729,10 +4695,10 @@
                     <a:lstStyle/>
                     <a:p>
                       <a:r>
-                        <a:rPr lang="en-US" sz="1800" dirty="0">
+                        <a:rPr lang="en-US">
                           <a:effectLst/>
                         </a:rPr>
-                        <a:t>Lab Notebooks</a:t>
+                        <a:t>Reproducibility of Workflows</a:t>
                       </a:r>
                     </a:p>
                   </a:txBody>
@@ -4752,10 +4718,10 @@
                     <a:p>
                       <a:pPr algn="r"/>
                       <a:r>
-                        <a:rPr lang="en-US" sz="1800" dirty="0">
+                        <a:rPr lang="en-US">
                           <a:effectLst/>
                         </a:rPr>
-                        <a:t>5:15 PM</a:t>
+                        <a:t>5:00 PM</a:t>
                       </a:r>
                     </a:p>
                   </a:txBody>
@@ -4767,11 +4733,14 @@
                     <a:lstStyle/>
                     <a:p>
                       <a:r>
-                        <a:rPr lang="en-US" sz="1800" i="0" dirty="0">
+                        <a:rPr lang="en-US" i="1" dirty="0">
                           <a:effectLst/>
                         </a:rPr>
-                        <a:t>Documentation</a:t>
+                        <a:t>Adjourn</a:t>
                       </a:r>
+                      <a:endParaRPr lang="en-US" dirty="0">
+                        <a:effectLst/>
+                      </a:endParaRPr>
                     </a:p>
                   </a:txBody>
                   <a:tcPr marL="142875" marR="142875" marT="95250" marB="95250" anchor="ctr"/>
@@ -4779,44 +4748,6 @@
                 <a:extLst>
                   <a:ext uri="{0D108BD9-81ED-4DB2-BD59-A6C34878D82A}">
                     <a16:rowId xmlns:a16="http://schemas.microsoft.com/office/drawing/2014/main" val="4002252475"/>
-                  </a:ext>
-                </a:extLst>
-              </a:tr>
-              <a:tr h="526542">
-                <a:tc>
-                  <a:txBody>
-                    <a:bodyPr/>
-                    <a:lstStyle/>
-                    <a:p>
-                      <a:pPr algn="r"/>
-                      <a:r>
-                        <a:rPr lang="en-US" sz="1800" dirty="0">
-                          <a:effectLst/>
-                        </a:rPr>
-                        <a:t>6:00 PM</a:t>
-                      </a:r>
-                    </a:p>
-                  </a:txBody>
-                  <a:tcPr marL="142875" marR="142875" marT="95250" marB="95250" anchor="ctr"/>
-                </a:tc>
-                <a:tc>
-                  <a:txBody>
-                    <a:bodyPr/>
-                    <a:lstStyle/>
-                    <a:p>
-                      <a:r>
-                        <a:rPr lang="en-US" sz="1800" dirty="0">
-                          <a:effectLst/>
-                        </a:rPr>
-                        <a:t>Adjourn</a:t>
-                      </a:r>
-                    </a:p>
-                  </a:txBody>
-                  <a:tcPr marL="142875" marR="142875" marT="95250" marB="95250" anchor="ctr"/>
-                </a:tc>
-                <a:extLst>
-                  <a:ext uri="{0D108BD9-81ED-4DB2-BD59-A6C34878D82A}">
-                    <a16:rowId xmlns:a16="http://schemas.microsoft.com/office/drawing/2014/main" val="3124768356"/>
                   </a:ext>
                 </a:extLst>
               </a:tr>
@@ -5076,36 +5007,26 @@
               <a:t>The requested citation the overall tutorial is: </a:t>
             </a:r>
             <a:r>
-              <a:rPr lang="en-US" sz="1600" b="0" i="0" dirty="0">
-                <a:solidFill>
-                  <a:srgbClr val="111111"/>
-                </a:solidFill>
-                <a:effectLst/>
-                <a:latin typeface="+mn-lt"/>
-              </a:rPr>
-              <a:t>Anshu Dubey, Better Scientific Software tutorial, in ISC High Performance (ISC24), Hamburg, Germany, and online, 2024. DOI: </a:t>
-            </a:r>
-            <a:r>
-              <a:rPr lang="en-US" sz="1600" b="0" i="0" u="none" strike="noStrike" dirty="0">
-                <a:solidFill>
-                  <a:srgbClr val="2A7AE2"/>
-                </a:solidFill>
-                <a:effectLst/>
-                <a:latin typeface="+mn-lt"/>
+              <a:rPr lang="en-US" sz="1600" dirty="0"/>
+              <a:t>Anshu Dubey and Gregory R. Watson, Software Practices for Reproducible Science tutorial, in 2024 ACM Conference on Reproducibility and Replicability (ACM-REP), Rennes, France and online, 2024. DOI: </a:t>
+            </a:r>
+            <a:r>
+              <a:rPr lang="en-US" sz="1600" dirty="0">
                 <a:hlinkClick r:id="rId4"/>
               </a:rPr>
-              <a:t>10.6084/m9.figshare.25686426</a:t>
-            </a:r>
-            <a:r>
-              <a:rPr lang="en-US" sz="1600" b="0" i="0" dirty="0">
-                <a:solidFill>
-                  <a:srgbClr val="111111"/>
-                </a:solidFill>
-                <a:effectLst/>
-                <a:latin typeface="+mn-lt"/>
-              </a:rPr>
+              <a:t>10.6084/m9.figshare.26019469</a:t>
+            </a:r>
+            <a:r>
+              <a:rPr lang="en-US" sz="1600" b="1" dirty="0"/>
               <a:t>.</a:t>
             </a:r>
+            <a:endParaRPr lang="en-US" sz="1600" b="0" i="0" dirty="0">
+              <a:solidFill>
+                <a:srgbClr val="111111"/>
+              </a:solidFill>
+              <a:effectLst/>
+              <a:latin typeface="+mn-lt"/>
+            </a:endParaRPr>
           </a:p>
           <a:p>
             <a:pPr>
@@ -5288,7 +5209,7 @@
     </p:spTree>
     <p:extLst>
       <p:ext uri="{BB962C8B-B14F-4D97-AF65-F5344CB8AC3E}">
-        <p14:creationId xmlns:p14="http://schemas.microsoft.com/office/powerpoint/2010/main" val="1595865985"/>
+        <p14:creationId xmlns:p14="http://schemas.microsoft.com/office/powerpoint/2010/main" val="978726433"/>
       </p:ext>
     </p:extLst>
   </p:cSld>
@@ -5352,6 +5273,17 @@
             </a:r>
           </a:p>
           <a:p>
+            <a:pPr>
+              <a:spcBef>
+                <a:spcPts val="1000"/>
+              </a:spcBef>
+            </a:pPr>
+            <a:r>
+              <a:rPr lang="en-US" dirty="0"/>
+              <a:t>Gregory R. Watson, ORNL</a:t>
+            </a:r>
+          </a:p>
+          <a:p>
             <a:pPr marL="0" indent="0">
               <a:spcBef>
                 <a:spcPts val="1000"/>
@@ -5390,34 +5322,222 @@
           </a:p>
         </p:txBody>
       </p:sp>
-      <p:grpSp>
-        <p:nvGrpSpPr>
-          <p:cNvPr id="17" name="Group 16">
+      <p:sp>
+        <p:nvSpPr>
+          <p:cNvPr id="4" name="TextBox 3">
             <a:extLst>
               <a:ext uri="{FF2B5EF4-FFF2-40B4-BE49-F238E27FC236}">
-                <a16:creationId xmlns:a16="http://schemas.microsoft.com/office/drawing/2014/main" id="{DA272CFF-B9D9-4F3C-A9E0-85E20DE1D51F}"/>
+                <a16:creationId xmlns:a16="http://schemas.microsoft.com/office/drawing/2014/main" id="{75F24105-9372-1C03-4BB0-9287BF335D4A}"/>
               </a:ext>
             </a:extLst>
           </p:cNvPr>
-          <p:cNvGrpSpPr>
-            <a:grpSpLocks noChangeAspect="1"/>
-          </p:cNvGrpSpPr>
+          <p:cNvSpPr txBox="1"/>
+          <p:nvPr/>
+        </p:nvSpPr>
+        <p:spPr>
+          <a:xfrm>
+            <a:off x="363095" y="4186797"/>
+            <a:ext cx="10123321" cy="1661993"/>
+          </a:xfrm>
+          <a:prstGeom prst="rect">
+            <a:avLst/>
+          </a:prstGeom>
+          <a:noFill/>
+        </p:spPr>
+        <p:txBody>
+          <a:bodyPr wrap="square">
+            <a:spAutoFit/>
+          </a:bodyPr>
+          <a:lstStyle/>
+          <a:p>
+            <a:pPr marL="227013" indent="-227013">
+              <a:spcBef>
+                <a:spcPts val="1800"/>
+              </a:spcBef>
+              <a:buFont typeface="Arial" panose="020B0604020202020204" pitchFamily="34" charset="0"/>
+              <a:buChar char="•"/>
+            </a:pPr>
+            <a:r>
+              <a:rPr lang="en-US" sz="2400" dirty="0"/>
+              <a:t>Lead PI for COLABS: Collaboration for Better Software for Science</a:t>
+            </a:r>
+          </a:p>
+          <a:p>
+            <a:pPr marL="227013" indent="-227013">
+              <a:spcBef>
+                <a:spcPts val="1800"/>
+              </a:spcBef>
+              <a:buFont typeface="Arial" panose="020B0604020202020204" pitchFamily="34" charset="0"/>
+              <a:buChar char="•"/>
+            </a:pPr>
+            <a:r>
+              <a:rPr lang="en-US" sz="2400" dirty="0"/>
+              <a:t>Application Engagement Lead for the RAPIDS </a:t>
+            </a:r>
+            <a:r>
+              <a:rPr lang="en-US" sz="2400" dirty="0" err="1"/>
+              <a:t>SciDAC</a:t>
+            </a:r>
+            <a:r>
+              <a:rPr lang="en-US" sz="2400" dirty="0"/>
+              <a:t> Institute</a:t>
+            </a:r>
+          </a:p>
+          <a:p>
+            <a:pPr marL="227013" indent="-227013">
+              <a:spcBef>
+                <a:spcPts val="1800"/>
+              </a:spcBef>
+              <a:buFont typeface="Arial" panose="020B0604020202020204" pitchFamily="34" charset="0"/>
+              <a:buChar char="•"/>
+            </a:pPr>
+            <a:r>
+              <a:rPr lang="en-US" sz="2400" dirty="0"/>
+              <a:t>Member of the IDEAS Productivity Project: </a:t>
+            </a:r>
+            <a:r>
+              <a:rPr lang="en-US" sz="2400" dirty="0">
+                <a:hlinkClick r:id="rId2"/>
+              </a:rPr>
+              <a:t>http://ideas-productivity.org</a:t>
+            </a:r>
+            <a:endParaRPr lang="en-US" sz="2400" dirty="0"/>
+          </a:p>
+        </p:txBody>
+      </p:sp>
+      <p:grpSp>
+        <p:nvGrpSpPr>
+          <p:cNvPr id="5" name="Group 4">
+            <a:extLst>
+              <a:ext uri="{FF2B5EF4-FFF2-40B4-BE49-F238E27FC236}">
+                <a16:creationId xmlns:a16="http://schemas.microsoft.com/office/drawing/2014/main" id="{3D009C9C-7569-AE4A-AB05-5A2D29A31C40}"/>
+              </a:ext>
+            </a:extLst>
+          </p:cNvPr>
+          <p:cNvGrpSpPr/>
           <p:nvPr/>
         </p:nvGrpSpPr>
         <p:grpSpPr>
           <a:xfrm>
-            <a:off x="5140279" y="973585"/>
-            <a:ext cx="1774634" cy="3358224"/>
+            <a:off x="7765265" y="1427736"/>
+            <a:ext cx="1038027" cy="1804941"/>
+            <a:chOff x="9222950" y="1485878"/>
+            <a:chExt cx="1038027" cy="1804941"/>
+          </a:xfrm>
+        </p:grpSpPr>
+        <p:pic>
+          <p:nvPicPr>
+            <p:cNvPr id="6" name="Picture 5" descr="A person wearing a hat&#10;&#10;Description automatically generated with medium confidence">
+              <a:extLst>
+                <a:ext uri="{FF2B5EF4-FFF2-40B4-BE49-F238E27FC236}">
+                  <a16:creationId xmlns:a16="http://schemas.microsoft.com/office/drawing/2014/main" id="{FD3F4FE7-F5B1-8BFB-24C4-F3D5551ECB92}"/>
+                </a:ext>
+              </a:extLst>
+            </p:cNvPr>
+            <p:cNvPicPr>
+              <a:picLocks noChangeAspect="1"/>
+            </p:cNvPicPr>
+            <p:nvPr/>
+          </p:nvPicPr>
+          <p:blipFill rotWithShape="1">
+            <a:blip r:embed="rId3">
+              <a:extLst>
+                <a:ext uri="{28A0092B-C50C-407E-A947-70E740481C1C}">
+                  <a14:useLocalDpi xmlns:a14="http://schemas.microsoft.com/office/drawing/2010/main" val="0"/>
+                </a:ext>
+              </a:extLst>
+            </a:blip>
+            <a:srcRect l="7000" t="-1515" r="7000" b="1515"/>
+            <a:stretch/>
+          </p:blipFill>
+          <p:spPr>
+            <a:xfrm>
+              <a:off x="9222950" y="1485878"/>
+              <a:ext cx="1038027" cy="1207008"/>
+            </a:xfrm>
+            <a:prstGeom prst="rect">
+              <a:avLst/>
+            </a:prstGeom>
+          </p:spPr>
+        </p:pic>
+        <p:sp>
+          <p:nvSpPr>
+            <p:cNvPr id="7" name="TextBox 6">
+              <a:extLst>
+                <a:ext uri="{FF2B5EF4-FFF2-40B4-BE49-F238E27FC236}">
+                  <a16:creationId xmlns:a16="http://schemas.microsoft.com/office/drawing/2014/main" id="{1399CAD7-0E59-DED6-C82F-315923010743}"/>
+                </a:ext>
+              </a:extLst>
+            </p:cNvPr>
+            <p:cNvSpPr txBox="1"/>
+            <p:nvPr/>
+          </p:nvSpPr>
+          <p:spPr>
+            <a:xfrm>
+              <a:off x="9252085" y="2699888"/>
+              <a:ext cx="979756" cy="590931"/>
+            </a:xfrm>
+            <a:prstGeom prst="rect">
+              <a:avLst/>
+            </a:prstGeom>
+            <a:noFill/>
+          </p:spPr>
+          <p:txBody>
+            <a:bodyPr wrap="none" rtlCol="0">
+              <a:spAutoFit/>
+            </a:bodyPr>
+            <a:lstStyle/>
+            <a:p>
+              <a:pPr algn="ctr">
+                <a:lnSpc>
+                  <a:spcPct val="90000"/>
+                </a:lnSpc>
+              </a:pPr>
+              <a:r>
+                <a:rPr lang="en-US" dirty="0"/>
+                <a:t>Greg W</a:t>
+              </a:r>
+            </a:p>
+            <a:p>
+              <a:pPr algn="ctr">
+                <a:lnSpc>
+                  <a:spcPct val="90000"/>
+                </a:lnSpc>
+              </a:pPr>
+              <a:r>
+                <a:rPr lang="en-US" i="1" dirty="0"/>
+                <a:t>he/him</a:t>
+              </a:r>
+            </a:p>
+          </p:txBody>
+        </p:sp>
+      </p:grpSp>
+      <p:grpSp>
+        <p:nvGrpSpPr>
+          <p:cNvPr id="8" name="Group 7">
+            <a:extLst>
+              <a:ext uri="{FF2B5EF4-FFF2-40B4-BE49-F238E27FC236}">
+                <a16:creationId xmlns:a16="http://schemas.microsoft.com/office/drawing/2014/main" id="{C22DEB37-50E6-2254-1FB5-B0F6E81B4E4A}"/>
+              </a:ext>
+            </a:extLst>
+          </p:cNvPr>
+          <p:cNvGrpSpPr/>
+          <p:nvPr/>
+        </p:nvGrpSpPr>
+        <p:grpSpPr>
+          <a:xfrm>
+            <a:off x="6094412" y="1427736"/>
+            <a:ext cx="954107" cy="1805497"/>
             <a:chOff x="6614147" y="1346049"/>
             <a:chExt cx="954107" cy="1805497"/>
           </a:xfrm>
         </p:grpSpPr>
         <p:sp>
           <p:nvSpPr>
-            <p:cNvPr id="18" name="TextBox 17">
+            <p:cNvPr id="9" name="TextBox 8">
               <a:extLst>
                 <a:ext uri="{FF2B5EF4-FFF2-40B4-BE49-F238E27FC236}">
-                  <a16:creationId xmlns:a16="http://schemas.microsoft.com/office/drawing/2014/main" id="{971CCA09-510A-41AB-BCC8-5DD005698C88}"/>
+                  <a16:creationId xmlns:a16="http://schemas.microsoft.com/office/drawing/2014/main" id="{CEB57978-C3B6-32C4-C6C6-52ACB58C8A06}"/>
                 </a:ext>
               </a:extLst>
             </p:cNvPr>
@@ -5465,10 +5585,10 @@
         </p:sp>
         <p:pic>
           <p:nvPicPr>
-            <p:cNvPr id="22" name="Picture 21" descr="A person smiling for the camera&#10;&#10;Description automatically generated with low confidence">
+            <p:cNvPr id="10" name="Picture 9" descr="A person smiling for the camera&#10;&#10;Description automatically generated with low confidence">
               <a:extLst>
                 <a:ext uri="{FF2B5EF4-FFF2-40B4-BE49-F238E27FC236}">
-                  <a16:creationId xmlns:a16="http://schemas.microsoft.com/office/drawing/2014/main" id="{A62F46AB-E9C9-409F-B158-23C56970CF2D}"/>
+                  <a16:creationId xmlns:a16="http://schemas.microsoft.com/office/drawing/2014/main" id="{4F1A04F2-5B52-D284-D8CF-CD12780422CE}"/>
                 </a:ext>
               </a:extLst>
             </p:cNvPr>
@@ -5478,7 +5598,7 @@
             <p:nvPr/>
           </p:nvPicPr>
           <p:blipFill>
-            <a:blip r:embed="rId2" cstate="print">
+            <a:blip r:embed="rId4" cstate="print">
               <a:extLst>
                 <a:ext uri="{28A0092B-C50C-407E-A947-70E740481C1C}">
                   <a14:useLocalDpi xmlns:a14="http://schemas.microsoft.com/office/drawing/2010/main" val="0"/>
@@ -5500,89 +5620,6 @@
           </p:spPr>
         </p:pic>
       </p:grpSp>
-      <p:sp>
-        <p:nvSpPr>
-          <p:cNvPr id="4" name="TextBox 3">
-            <a:extLst>
-              <a:ext uri="{FF2B5EF4-FFF2-40B4-BE49-F238E27FC236}">
-                <a16:creationId xmlns:a16="http://schemas.microsoft.com/office/drawing/2014/main" id="{75F24105-9372-1C03-4BB0-9287BF335D4A}"/>
-              </a:ext>
-            </a:extLst>
-          </p:cNvPr>
-          <p:cNvSpPr txBox="1"/>
-          <p:nvPr/>
-        </p:nvSpPr>
-        <p:spPr>
-          <a:xfrm>
-            <a:off x="363095" y="4186797"/>
-            <a:ext cx="10123321" cy="1661993"/>
-          </a:xfrm>
-          <a:prstGeom prst="rect">
-            <a:avLst/>
-          </a:prstGeom>
-          <a:noFill/>
-        </p:spPr>
-        <p:txBody>
-          <a:bodyPr wrap="square">
-            <a:spAutoFit/>
-          </a:bodyPr>
-          <a:lstStyle/>
-          <a:p>
-            <a:pPr marL="227013" indent="-227013">
-              <a:spcBef>
-                <a:spcPts val="1800"/>
-              </a:spcBef>
-              <a:buFont typeface="Arial" panose="020B0604020202020204" pitchFamily="34" charset="0"/>
-              <a:buChar char="•"/>
-            </a:pPr>
-            <a:r>
-              <a:rPr lang="en-US" sz="2400" dirty="0"/>
-              <a:t>Lead PI for COLABS: Collaboration for Better Software for Science</a:t>
-            </a:r>
-          </a:p>
-          <a:p>
-            <a:pPr marL="227013" indent="-227013">
-              <a:spcBef>
-                <a:spcPts val="1800"/>
-              </a:spcBef>
-              <a:buFont typeface="Arial" panose="020B0604020202020204" pitchFamily="34" charset="0"/>
-              <a:buChar char="•"/>
-            </a:pPr>
-            <a:r>
-              <a:rPr lang="en-US" sz="2400" dirty="0"/>
-              <a:t>Application Engagement Lead for the RAPIDS </a:t>
-            </a:r>
-            <a:r>
-              <a:rPr lang="en-US" sz="2400" dirty="0" err="1"/>
-              <a:t>SciDAC</a:t>
-            </a:r>
-            <a:r>
-              <a:rPr lang="en-US" sz="2400" dirty="0"/>
-              <a:t> Institute</a:t>
-            </a:r>
-          </a:p>
-          <a:p>
-            <a:pPr marL="227013" indent="-227013">
-              <a:spcBef>
-                <a:spcPts val="1800"/>
-              </a:spcBef>
-              <a:buFont typeface="Arial" panose="020B0604020202020204" pitchFamily="34" charset="0"/>
-              <a:buChar char="•"/>
-            </a:pPr>
-            <a:r>
-              <a:rPr lang="en-US" sz="2400" dirty="0"/>
-              <a:t>Member of the IDEAS Productivity Project: </a:t>
-            </a:r>
-            <a:r>
-              <a:rPr lang="en-US" sz="2400" dirty="0">
-                <a:hlinkClick r:id="rId3"/>
-              </a:rPr>
-              <a:t>http://ideas-productivity.org</a:t>
-            </a:r>
-            <a:endParaRPr lang="en-US" sz="2400" dirty="0"/>
-          </a:p>
-        </p:txBody>
-      </p:sp>
     </p:spTree>
     <p:extLst>
       <p:ext uri="{BB962C8B-B14F-4D97-AF65-F5344CB8AC3E}">
@@ -6945,82 +6982,6 @@
             <a:r>
               <a:rPr lang="en-US" dirty="0"/>
               <a:t> page for all tutorial materials</a:t>
-            </a:r>
-          </a:p>
-        </p:txBody>
-      </p:sp>
-      <p:sp>
-        <p:nvSpPr>
-          <p:cNvPr id="4" name="TextBox 3">
-            <a:extLst>
-              <a:ext uri="{FF2B5EF4-FFF2-40B4-BE49-F238E27FC236}">
-                <a16:creationId xmlns:a16="http://schemas.microsoft.com/office/drawing/2014/main" id="{A5930DDF-DCEE-AE67-9936-FEA881563FF7}"/>
-              </a:ext>
-            </a:extLst>
-          </p:cNvPr>
-          <p:cNvSpPr txBox="1"/>
-          <p:nvPr/>
-        </p:nvSpPr>
-        <p:spPr>
-          <a:xfrm>
-            <a:off x="1239622" y="4777000"/>
-            <a:ext cx="9709581" cy="1098762"/>
-          </a:xfrm>
-          <a:prstGeom prst="rect">
-            <a:avLst/>
-          </a:prstGeom>
-          <a:solidFill>
-            <a:srgbClr val="FFFF00"/>
-          </a:solidFill>
-          <a:ln w="28575">
-            <a:solidFill>
-              <a:schemeClr val="tx1"/>
-            </a:solidFill>
-          </a:ln>
-        </p:spPr>
-        <p:txBody>
-          <a:bodyPr wrap="none" lIns="118872" tIns="91440" rIns="118872" bIns="91440" rtlCol="0" anchor="ctr" anchorCtr="0">
-            <a:spAutoFit/>
-          </a:bodyPr>
-          <a:lstStyle/>
-          <a:p>
-            <a:pPr algn="ctr">
-              <a:lnSpc>
-                <a:spcPct val="90000"/>
-              </a:lnSpc>
-            </a:pPr>
-            <a:r>
-              <a:rPr lang="en-US" sz="2400" dirty="0"/>
-              <a:t>You may also be interested in other software-related events at ISC24!</a:t>
-            </a:r>
-          </a:p>
-          <a:p>
-            <a:pPr algn="ctr">
-              <a:lnSpc>
-                <a:spcPct val="90000"/>
-              </a:lnSpc>
-            </a:pPr>
-            <a:r>
-              <a:rPr lang="en-US" sz="2400" dirty="0"/>
-              <a:t>Visit </a:t>
-            </a:r>
-            <a:r>
-              <a:rPr lang="en-US" sz="2400" dirty="0">
-                <a:hlinkClick r:id="rId4"/>
-              </a:rPr>
-              <a:t>https://bssw.io/events/isc24-software-related-events</a:t>
-            </a:r>
-            <a:endParaRPr lang="en-US" sz="2400" dirty="0"/>
-          </a:p>
-          <a:p>
-            <a:pPr algn="ctr">
-              <a:lnSpc>
-                <a:spcPct val="90000"/>
-              </a:lnSpc>
-            </a:pPr>
-            <a:r>
-              <a:rPr lang="en-US" dirty="0"/>
-              <a:t>(link is also on tutorial webpage)</a:t>
             </a:r>
           </a:p>
         </p:txBody>
@@ -7951,6 +7912,12 @@
 </file>
 
 <file path=customXml/item1.xml><?xml version="1.0" encoding="utf-8"?>
+<p:properties xmlns:p="http://schemas.microsoft.com/office/2006/metadata/properties" xmlns:xsi="http://www.w3.org/2001/XMLSchema-instance" xmlns:pc="http://schemas.microsoft.com/office/infopath/2007/PartnerControls">
+  <documentManagement/>
+</p:properties>
+</file>
+
+<file path=customXml/item2.xml><?xml version="1.0" encoding="utf-8"?>
 <ct:contentTypeSchema xmlns:ct="http://schemas.microsoft.com/office/2006/metadata/contentType" xmlns:ma="http://schemas.microsoft.com/office/2006/metadata/properties/metaAttributes" ct:_="" ma:_="" ma:contentTypeName="Document" ma:contentTypeID="0x010100565464437F680748A68B85EB6594EA7D" ma:contentTypeVersion="0" ma:contentTypeDescription="Create a new document." ma:contentTypeScope="" ma:versionID="fe3f4dd58d5914c51cfc6deaa8ad845c">
   <xsd:schema xmlns:xsd="http://www.w3.org/2001/XMLSchema" xmlns:p="http://schemas.microsoft.com/office/2006/metadata/properties" targetNamespace="http://schemas.microsoft.com/office/2006/metadata/properties" ma:root="true" ma:fieldsID="4aeb20c0e3442673af7ee10786458764">
     <xsd:element name="properties">
@@ -7999,12 +7966,6 @@
 </ct:contentTypeSchema>
 </file>
 
-<file path=customXml/item2.xml><?xml version="1.0" encoding="utf-8"?>
-<p:properties xmlns:p="http://schemas.microsoft.com/office/2006/metadata/properties" xmlns:xsi="http://www.w3.org/2001/XMLSchema-instance" xmlns:pc="http://schemas.microsoft.com/office/infopath/2007/PartnerControls">
-  <documentManagement/>
-</p:properties>
-</file>
-
 <file path=customXml/item3.xml><?xml version="1.0" encoding="utf-8"?>
 <?mso-contentType ?>
 <FormTemplates xmlns="http://schemas.microsoft.com/sharepoint/v3/contenttype/forms">
@@ -8015,6 +7976,21 @@
 </file>
 
 <file path=customXml/itemProps1.xml><?xml version="1.0" encoding="utf-8"?>
+<ds:datastoreItem xmlns:ds="http://schemas.openxmlformats.org/officeDocument/2006/customXml" ds:itemID="{A50EC660-24D0-43A0-AE5E-E274115E726B}">
+  <ds:schemaRefs>
+    <ds:schemaRef ds:uri="http://purl.org/dc/elements/1.1/"/>
+    <ds:schemaRef ds:uri="http://schemas.microsoft.com/office/2006/metadata/properties"/>
+    <ds:schemaRef ds:uri="http://purl.org/dc/terms/"/>
+    <ds:schemaRef ds:uri="http://schemas.openxmlformats.org/package/2006/metadata/core-properties"/>
+    <ds:schemaRef ds:uri="http://schemas.microsoft.com/office/2006/documentManagement/types"/>
+    <ds:schemaRef ds:uri="http://www.w3.org/XML/1998/namespace"/>
+    <ds:schemaRef ds:uri="http://purl.org/dc/dcmitype/"/>
+    <ds:schemaRef ds:uri="http://schemas.microsoft.com/office/infopath/2007/PartnerControls"/>
+  </ds:schemaRefs>
+</ds:datastoreItem>
+</file>
+
+<file path=customXml/itemProps2.xml><?xml version="1.0" encoding="utf-8"?>
 <ds:datastoreItem xmlns:ds="http://schemas.openxmlformats.org/officeDocument/2006/customXml" ds:itemID="{E8DB7DEB-074E-4EE8-9B6E-FD277323109C}">
   <ds:schemaRefs>
     <ds:schemaRef ds:uri="http://schemas.microsoft.com/office/2006/metadata/contentType"/>
@@ -8029,21 +8005,6 @@
 </ds:datastoreItem>
 </file>
 
-<file path=customXml/itemProps2.xml><?xml version="1.0" encoding="utf-8"?>
-<ds:datastoreItem xmlns:ds="http://schemas.openxmlformats.org/officeDocument/2006/customXml" ds:itemID="{A50EC660-24D0-43A0-AE5E-E274115E726B}">
-  <ds:schemaRefs>
-    <ds:schemaRef ds:uri="http://purl.org/dc/elements/1.1/"/>
-    <ds:schemaRef ds:uri="http://schemas.microsoft.com/office/2006/metadata/properties"/>
-    <ds:schemaRef ds:uri="http://purl.org/dc/terms/"/>
-    <ds:schemaRef ds:uri="http://schemas.openxmlformats.org/package/2006/metadata/core-properties"/>
-    <ds:schemaRef ds:uri="http://schemas.microsoft.com/office/2006/documentManagement/types"/>
-    <ds:schemaRef ds:uri="http://www.w3.org/XML/1998/namespace"/>
-    <ds:schemaRef ds:uri="http://purl.org/dc/dcmitype/"/>
-    <ds:schemaRef ds:uri="http://schemas.microsoft.com/office/infopath/2007/PartnerControls"/>
-  </ds:schemaRefs>
-</ds:datastoreItem>
-</file>
-
 <file path=customXml/itemProps3.xml><?xml version="1.0" encoding="utf-8"?>
 <ds:datastoreItem xmlns:ds="http://schemas.openxmlformats.org/officeDocument/2006/customXml" ds:itemID="{19E20559-B232-4371-8690-E3D8007EDB82}">
   <ds:schemaRefs>

</xml_diff>

<commit_message>
modified presentations for ACM-REP
</commit_message>
<xml_diff>
--- a/intro-a.pptx
+++ b/intro-a.pptx
@@ -264,7 +264,7 @@
           <a:p>
             <a:fld id="{0B842F42-2CE9-4E35-95C1-410DC08A50B1}" type="datetimeFigureOut">
               <a:rPr lang="en-US" smtClean="0"/>
-              <a:t>6/11/2024</a:t>
+              <a:t>6/12/24</a:t>
             </a:fld>
             <a:endParaRPr lang="en-US"/>
           </a:p>
@@ -429,7 +429,7 @@
           <a:p>
             <a:fld id="{6F282904-F315-4730-8D91-37D99E141A6F}" type="datetimeFigureOut">
               <a:rPr lang="en-US" smtClean="0"/>
-              <a:t>6/11/2024</a:t>
+              <a:t>6/12/24</a:t>
             </a:fld>
             <a:endParaRPr lang="en-US"/>
           </a:p>
@@ -5336,8 +5336,8 @@
         </p:nvSpPr>
         <p:spPr>
           <a:xfrm>
-            <a:off x="363095" y="4186797"/>
-            <a:ext cx="10123321" cy="1661993"/>
+            <a:off x="453256" y="3373816"/>
+            <a:ext cx="10123321" cy="2308324"/>
           </a:xfrm>
           <a:prstGeom prst="rect">
             <a:avLst/>
@@ -5359,40 +5359,53 @@
             </a:pPr>
             <a:r>
               <a:rPr lang="en-US" sz="2400" dirty="0"/>
-              <a:t>Lead PI for COLABS: Collaboration for Better Software for Science</a:t>
-            </a:r>
-          </a:p>
-          <a:p>
-            <a:pPr marL="227013" indent="-227013">
+              <a:t>Anshu </a:t>
+            </a:r>
+          </a:p>
+          <a:p>
+            <a:pPr marL="684213" lvl="1" indent="-227013">
               <a:spcBef>
-                <a:spcPts val="1800"/>
+                <a:spcPts val="0"/>
               </a:spcBef>
               <a:buFont typeface="Arial" panose="020B0604020202020204" pitchFamily="34" charset="0"/>
               <a:buChar char="•"/>
             </a:pPr>
             <a:r>
               <a:rPr lang="en-US" sz="2400" dirty="0"/>
-              <a:t>Application Engagement Lead for the RAPIDS </a:t>
-            </a:r>
-            <a:r>
-              <a:rPr lang="en-US" sz="2400" dirty="0" err="1"/>
-              <a:t>SciDAC</a:t>
-            </a:r>
-            <a:r>
-              <a:rPr lang="en-US" sz="2400" dirty="0"/>
-              <a:t> Institute</a:t>
-            </a:r>
-          </a:p>
-          <a:p>
-            <a:pPr marL="227013" indent="-227013">
+              <a:t>Lead PI for COLABS: Collaboration for Better Software for Science</a:t>
+            </a:r>
+          </a:p>
+          <a:p>
+            <a:pPr marL="684213" lvl="1" indent="-227013">
               <a:spcBef>
-                <a:spcPts val="1800"/>
+                <a:spcPts val="0"/>
               </a:spcBef>
               <a:buFont typeface="Arial" panose="020B0604020202020204" pitchFamily="34" charset="0"/>
               <a:buChar char="•"/>
             </a:pPr>
             <a:r>
               <a:rPr lang="en-US" sz="2400" dirty="0"/>
+              <a:t>Application Engagement Lead for the RAPIDS </a:t>
+            </a:r>
+            <a:r>
+              <a:rPr lang="en-US" sz="2400" dirty="0" err="1"/>
+              <a:t>SciDAC</a:t>
+            </a:r>
+            <a:r>
+              <a:rPr lang="en-US" sz="2400" dirty="0"/>
+              <a:t> Institute</a:t>
+            </a:r>
+          </a:p>
+          <a:p>
+            <a:pPr marL="684213" lvl="1" indent="-227013">
+              <a:spcBef>
+                <a:spcPts val="0"/>
+              </a:spcBef>
+              <a:buFont typeface="Arial" panose="020B0604020202020204" pitchFamily="34" charset="0"/>
+              <a:buChar char="•"/>
+            </a:pPr>
+            <a:r>
+              <a:rPr lang="en-US" sz="2400" dirty="0"/>
               <a:t>Member of the IDEAS Productivity Project: </a:t>
             </a:r>
             <a:r>
@@ -5402,6 +5415,19 @@
               <a:t>http://ideas-productivity.org</a:t>
             </a:r>
             <a:endParaRPr lang="en-US" sz="2400" dirty="0"/>
+          </a:p>
+          <a:p>
+            <a:pPr marL="227013" indent="-227013">
+              <a:spcBef>
+                <a:spcPts val="0"/>
+              </a:spcBef>
+              <a:buFont typeface="Arial" panose="020B0604020202020204" pitchFamily="34" charset="0"/>
+              <a:buChar char="•"/>
+            </a:pPr>
+            <a:r>
+              <a:rPr lang="en-US" sz="2400" dirty="0"/>
+              <a:t>Greg</a:t>
+            </a:r>
           </a:p>
         </p:txBody>
       </p:sp>
@@ -7912,9 +7938,12 @@
 </file>
 
 <file path=customXml/item1.xml><?xml version="1.0" encoding="utf-8"?>
-<p:properties xmlns:p="http://schemas.microsoft.com/office/2006/metadata/properties" xmlns:xsi="http://www.w3.org/2001/XMLSchema-instance" xmlns:pc="http://schemas.microsoft.com/office/infopath/2007/PartnerControls">
-  <documentManagement/>
-</p:properties>
+<?mso-contentType ?>
+<FormTemplates xmlns="http://schemas.microsoft.com/sharepoint/v3/contenttype/forms">
+  <Display>DocumentLibraryForm</Display>
+  <Edit>DocumentLibraryForm</Edit>
+  <New>DocumentLibraryForm</New>
+</FormTemplates>
 </file>
 
 <file path=customXml/item2.xml><?xml version="1.0" encoding="utf-8"?>
@@ -7967,25 +7996,15 @@
 </file>
 
 <file path=customXml/item3.xml><?xml version="1.0" encoding="utf-8"?>
-<?mso-contentType ?>
-<FormTemplates xmlns="http://schemas.microsoft.com/sharepoint/v3/contenttype/forms">
-  <Display>DocumentLibraryForm</Display>
-  <Edit>DocumentLibraryForm</Edit>
-  <New>DocumentLibraryForm</New>
-</FormTemplates>
+<p:properties xmlns:p="http://schemas.microsoft.com/office/2006/metadata/properties" xmlns:xsi="http://www.w3.org/2001/XMLSchema-instance" xmlns:pc="http://schemas.microsoft.com/office/infopath/2007/PartnerControls">
+  <documentManagement/>
+</p:properties>
 </file>
 
 <file path=customXml/itemProps1.xml><?xml version="1.0" encoding="utf-8"?>
-<ds:datastoreItem xmlns:ds="http://schemas.openxmlformats.org/officeDocument/2006/customXml" ds:itemID="{A50EC660-24D0-43A0-AE5E-E274115E726B}">
+<ds:datastoreItem xmlns:ds="http://schemas.openxmlformats.org/officeDocument/2006/customXml" ds:itemID="{19E20559-B232-4371-8690-E3D8007EDB82}">
   <ds:schemaRefs>
-    <ds:schemaRef ds:uri="http://purl.org/dc/elements/1.1/"/>
-    <ds:schemaRef ds:uri="http://schemas.microsoft.com/office/2006/metadata/properties"/>
-    <ds:schemaRef ds:uri="http://purl.org/dc/terms/"/>
-    <ds:schemaRef ds:uri="http://schemas.openxmlformats.org/package/2006/metadata/core-properties"/>
-    <ds:schemaRef ds:uri="http://schemas.microsoft.com/office/2006/documentManagement/types"/>
-    <ds:schemaRef ds:uri="http://www.w3.org/XML/1998/namespace"/>
-    <ds:schemaRef ds:uri="http://purl.org/dc/dcmitype/"/>
-    <ds:schemaRef ds:uri="http://schemas.microsoft.com/office/infopath/2007/PartnerControls"/>
+    <ds:schemaRef ds:uri="http://schemas.microsoft.com/sharepoint/v3/contenttype/forms"/>
   </ds:schemaRefs>
 </ds:datastoreItem>
 </file>
@@ -8006,9 +8025,16 @@
 </file>
 
 <file path=customXml/itemProps3.xml><?xml version="1.0" encoding="utf-8"?>
-<ds:datastoreItem xmlns:ds="http://schemas.openxmlformats.org/officeDocument/2006/customXml" ds:itemID="{19E20559-B232-4371-8690-E3D8007EDB82}">
+<ds:datastoreItem xmlns:ds="http://schemas.openxmlformats.org/officeDocument/2006/customXml" ds:itemID="{A50EC660-24D0-43A0-AE5E-E274115E726B}">
   <ds:schemaRefs>
-    <ds:schemaRef ds:uri="http://schemas.microsoft.com/sharepoint/v3/contenttype/forms"/>
+    <ds:schemaRef ds:uri="http://purl.org/dc/elements/1.1/"/>
+    <ds:schemaRef ds:uri="http://schemas.microsoft.com/office/2006/metadata/properties"/>
+    <ds:schemaRef ds:uri="http://purl.org/dc/terms/"/>
+    <ds:schemaRef ds:uri="http://schemas.openxmlformats.org/package/2006/metadata/core-properties"/>
+    <ds:schemaRef ds:uri="http://schemas.microsoft.com/office/2006/documentManagement/types"/>
+    <ds:schemaRef ds:uri="http://www.w3.org/XML/1998/namespace"/>
+    <ds:schemaRef ds:uri="http://purl.org/dc/dcmitype/"/>
+    <ds:schemaRef ds:uri="http://schemas.microsoft.com/office/infopath/2007/PartnerControls"/>
   </ds:schemaRefs>
 </ds:datastoreItem>
 </file>
</xml_diff>

<commit_message>
Update David's presentations for ATPESC
</commit_message>
<xml_diff>
--- a/intro-a.pptx
+++ b/intro-a.pptx
@@ -5,10 +5,10 @@
     <p:sldMasterId id="2147483935" r:id="rId4"/>
   </p:sldMasterIdLst>
   <p:notesMasterIdLst>
-    <p:notesMasterId r:id="rId15"/>
+    <p:notesMasterId r:id="rId16"/>
   </p:notesMasterIdLst>
   <p:handoutMasterIdLst>
-    <p:handoutMasterId r:id="rId16"/>
+    <p:handoutMasterId r:id="rId17"/>
   </p:handoutMasterIdLst>
   <p:sldIdLst>
     <p:sldId id="617" r:id="rId5"/>
@@ -20,7 +20,8 @@
     <p:sldId id="620" r:id="rId11"/>
     <p:sldId id="622" r:id="rId12"/>
     <p:sldId id="616" r:id="rId13"/>
-    <p:sldId id="261" r:id="rId14"/>
+    <p:sldId id="624" r:id="rId14"/>
+    <p:sldId id="261" r:id="rId15"/>
   </p:sldIdLst>
   <p:sldSz cx="12188825" cy="6858000"/>
   <p:notesSz cx="7010400" cy="9296400"/>
@@ -264,7 +265,7 @@
           <a:p>
             <a:fld id="{0B842F42-2CE9-4E35-95C1-410DC08A50B1}" type="datetimeFigureOut">
               <a:rPr lang="en-US" smtClean="0"/>
-              <a:t>6/13/24</a:t>
+              <a:t>7/26/2024</a:t>
             </a:fld>
             <a:endParaRPr lang="en-US"/>
           </a:p>
@@ -429,7 +430,7 @@
           <a:p>
             <a:fld id="{6F282904-F315-4730-8D91-37D99E141A6F}" type="datetimeFigureOut">
               <a:rPr lang="en-US" smtClean="0"/>
-              <a:t>6/13/24</a:t>
+              <a:t>7/26/2024</a:t>
             </a:fld>
             <a:endParaRPr lang="en-US"/>
           </a:p>
@@ -4248,27 +4249,25 @@
           <a:p>
             <a:r>
               <a:rPr lang="en-US" dirty="0"/>
-              <a:t>Anshu Dubey and Gregory R. Watson</a:t>
-            </a:r>
-          </a:p>
-          <a:p>
-            <a:r>
-              <a:rPr lang="en-US" b="0" i="0" dirty="0">
+              <a:t>David E. Bernholdt, Anshu Dubey, Todd Gamblin, and Jared O’Neal</a:t>
+            </a:r>
+          </a:p>
+          <a:p>
+            <a:pPr>
+              <a:spcBef>
+                <a:spcPts val="2800"/>
+              </a:spcBef>
+            </a:pPr>
+            <a:r>
+              <a:rPr lang="en-US" sz="2000" b="0" i="0" dirty="0">
                 <a:solidFill>
                   <a:srgbClr val="111111"/>
                 </a:solidFill>
                 <a:effectLst/>
-                <a:latin typeface="-apple-system"/>
+                <a:latin typeface="+mn-lt"/>
               </a:rPr>
-              <a:t>2024 ACM Conference on Reproducibility and Replicability (ACM-REP)</a:t>
-            </a:r>
-            <a:endParaRPr lang="en-US" b="0" i="0" dirty="0">
-              <a:solidFill>
-                <a:srgbClr val="111111"/>
-              </a:solidFill>
-              <a:effectLst/>
-              <a:latin typeface="+mn-lt"/>
-            </a:endParaRPr>
+              <a:t>Software Productivity and Sustainability track @ Argonne Training Program on Extreme-Scale Computing summer school</a:t>
+            </a:r>
           </a:p>
         </p:txBody>
       </p:sp>
@@ -4389,7 +4388,7 @@
           <a:p>
             <a:r>
               <a:rPr lang="en-US" dirty="0"/>
-              <a:t>Agenda</a:t>
+              <a:t>Agenda (1/2)</a:t>
             </a:r>
           </a:p>
         </p:txBody>
@@ -4410,14 +4409,14 @@
             <p:ph idx="1"/>
             <p:extLst>
               <p:ext uri="{D42A27DB-BD31-4B8C-83A1-F6EECF244321}">
-                <p14:modId xmlns:p14="http://schemas.microsoft.com/office/powerpoint/2010/main" val="1181368582"/>
+                <p14:modId xmlns:p14="http://schemas.microsoft.com/office/powerpoint/2010/main" val="620732246"/>
               </p:ext>
             </p:extLst>
           </p:nvPr>
         </p:nvGraphicFramePr>
         <p:xfrm>
           <a:off x="1051560" y="1074420"/>
-          <a:ext cx="9692640" cy="4424934"/>
+          <a:ext cx="9692640" cy="4637532"/>
         </p:xfrm>
         <a:graphic>
           <a:graphicData uri="http://schemas.openxmlformats.org/drawingml/2006/table">
@@ -4426,14 +4425,21 @@
                 <a:tableStyleId>{5C22544A-7EE6-4342-B048-85BDC9FD1C3A}</a:tableStyleId>
               </a:tblPr>
               <a:tblGrid>
-                <a:gridCol w="1540110">
+                <a:gridCol w="1328947">
                   <a:extLst>
                     <a:ext uri="{9D8B030D-6E8A-4147-A177-3AD203B41FA5}">
                       <a16:colId xmlns:a16="http://schemas.microsoft.com/office/drawing/2014/main" val="41390910"/>
                     </a:ext>
                   </a:extLst>
                 </a:gridCol>
-                <a:gridCol w="8152530">
+                <a:gridCol w="5033753">
+                  <a:extLst>
+                    <a:ext uri="{9D8B030D-6E8A-4147-A177-3AD203B41FA5}">
+                      <a16:colId xmlns:a16="http://schemas.microsoft.com/office/drawing/2014/main" val="2092910534"/>
+                    </a:ext>
+                  </a:extLst>
+                </a:gridCol>
+                <a:gridCol w="3329940">
                   <a:extLst>
                     <a:ext uri="{9D8B030D-6E8A-4147-A177-3AD203B41FA5}">
                       <a16:colId xmlns:a16="http://schemas.microsoft.com/office/drawing/2014/main" val="1261297711"/>
@@ -4452,7 +4458,23 @@
                         <a:rPr lang="en-US" sz="1800" dirty="0">
                           <a:effectLst/>
                         </a:rPr>
-                        <a:t>Time (CEST)</a:t>
+                        <a:t>Time (CDT)</a:t>
+                      </a:r>
+                    </a:p>
+                  </a:txBody>
+                  <a:tcPr marL="142875" marR="142875" marT="95250" marB="95250" anchor="ctr"/>
+                </a:tc>
+                <a:tc>
+                  <a:txBody>
+                    <a:bodyPr/>
+                    <a:lstStyle/>
+                    <a:p>
+                      <a:pPr algn="l"/>
+                      <a:r>
+                        <a:rPr lang="en-US" sz="1800" dirty="0">
+                          <a:effectLst/>
+                        </a:rPr>
+                        <a:t>Title</a:t>
                       </a:r>
                     </a:p>
                   </a:txBody>
@@ -4467,7 +4489,7 @@
                         <a:rPr lang="en-US" sz="1800" dirty="0">
                           <a:effectLst/>
                         </a:rPr>
-                        <a:t>Title</a:t>
+                        <a:t>Presenter</a:t>
                       </a:r>
                     </a:p>
                   </a:txBody>
@@ -4476,6 +4498,722 @@
                 <a:extLst>
                   <a:ext uri="{0D108BD9-81ED-4DB2-BD59-A6C34878D82A}">
                     <a16:rowId xmlns:a16="http://schemas.microsoft.com/office/drawing/2014/main" val="2098024418"/>
+                  </a:ext>
+                </a:extLst>
+              </a:tr>
+              <a:tr h="526542">
+                <a:tc>
+                  <a:txBody>
+                    <a:bodyPr/>
+                    <a:lstStyle/>
+                    <a:p>
+                      <a:pPr algn="r"/>
+                      <a:r>
+                        <a:rPr lang="en-US" dirty="0">
+                          <a:effectLst/>
+                        </a:rPr>
+                        <a:t>8:30 AM</a:t>
+                      </a:r>
+                    </a:p>
+                  </a:txBody>
+                  <a:tcPr marL="142875" marR="142875" marT="95250" marB="95250" anchor="ctr"/>
+                </a:tc>
+                <a:tc>
+                  <a:txBody>
+                    <a:bodyPr/>
+                    <a:lstStyle/>
+                    <a:p>
+                      <a:r>
+                        <a:rPr lang="en-US">
+                          <a:effectLst/>
+                        </a:rPr>
+                        <a:t>Introduction</a:t>
+                      </a:r>
+                    </a:p>
+                  </a:txBody>
+                  <a:tcPr marL="142875" marR="142875" marT="95250" marB="95250" anchor="ctr"/>
+                </a:tc>
+                <a:tc>
+                  <a:txBody>
+                    <a:bodyPr/>
+                    <a:lstStyle/>
+                    <a:p>
+                      <a:r>
+                        <a:rPr lang="en-US">
+                          <a:effectLst/>
+                        </a:rPr>
+                        <a:t>David E. Bernholdt (ORNL)</a:t>
+                      </a:r>
+                    </a:p>
+                  </a:txBody>
+                  <a:tcPr marL="142875" marR="142875" marT="95250" marB="95250" anchor="ctr"/>
+                </a:tc>
+                <a:extLst>
+                  <a:ext uri="{0D108BD9-81ED-4DB2-BD59-A6C34878D82A}">
+                    <a16:rowId xmlns:a16="http://schemas.microsoft.com/office/drawing/2014/main" val="4011846257"/>
+                  </a:ext>
+                </a:extLst>
+              </a:tr>
+              <a:tr h="526542">
+                <a:tc>
+                  <a:txBody>
+                    <a:bodyPr/>
+                    <a:lstStyle/>
+                    <a:p>
+                      <a:pPr algn="r"/>
+                      <a:r>
+                        <a:rPr lang="en-US">
+                          <a:effectLst/>
+                        </a:rPr>
+                        <a:t>8:35 AM</a:t>
+                      </a:r>
+                    </a:p>
+                  </a:txBody>
+                  <a:tcPr marL="142875" marR="142875" marT="95250" marB="95250" anchor="ctr"/>
+                </a:tc>
+                <a:tc>
+                  <a:txBody>
+                    <a:bodyPr/>
+                    <a:lstStyle/>
+                    <a:p>
+                      <a:r>
+                        <a:rPr lang="en-US">
+                          <a:effectLst/>
+                        </a:rPr>
+                        <a:t>Motivation and Overview of Best Practices in HPC Software Development</a:t>
+                      </a:r>
+                    </a:p>
+                  </a:txBody>
+                  <a:tcPr marL="142875" marR="142875" marT="95250" marB="95250" anchor="ctr"/>
+                </a:tc>
+                <a:tc>
+                  <a:txBody>
+                    <a:bodyPr/>
+                    <a:lstStyle/>
+                    <a:p>
+                      <a:r>
+                        <a:rPr lang="en-US">
+                          <a:effectLst/>
+                        </a:rPr>
+                        <a:t>David E. Bernholdt (ORNL)</a:t>
+                      </a:r>
+                    </a:p>
+                  </a:txBody>
+                  <a:tcPr marL="142875" marR="142875" marT="95250" marB="95250" anchor="ctr"/>
+                </a:tc>
+                <a:extLst>
+                  <a:ext uri="{0D108BD9-81ED-4DB2-BD59-A6C34878D82A}">
+                    <a16:rowId xmlns:a16="http://schemas.microsoft.com/office/drawing/2014/main" val="541819896"/>
+                  </a:ext>
+                </a:extLst>
+              </a:tr>
+              <a:tr h="526542">
+                <a:tc>
+                  <a:txBody>
+                    <a:bodyPr/>
+                    <a:lstStyle/>
+                    <a:p>
+                      <a:pPr algn="r"/>
+                      <a:r>
+                        <a:rPr lang="en-US">
+                          <a:effectLst/>
+                        </a:rPr>
+                        <a:t>9:15 AM</a:t>
+                      </a:r>
+                    </a:p>
+                  </a:txBody>
+                  <a:tcPr marL="142875" marR="142875" marT="95250" marB="95250" anchor="ctr"/>
+                </a:tc>
+                <a:tc>
+                  <a:txBody>
+                    <a:bodyPr/>
+                    <a:lstStyle/>
+                    <a:p>
+                      <a:r>
+                        <a:rPr lang="en-US">
+                          <a:effectLst/>
+                        </a:rPr>
+                        <a:t>Scientific Software Design</a:t>
+                      </a:r>
+                    </a:p>
+                  </a:txBody>
+                  <a:tcPr marL="142875" marR="142875" marT="95250" marB="95250" anchor="ctr"/>
+                </a:tc>
+                <a:tc>
+                  <a:txBody>
+                    <a:bodyPr/>
+                    <a:lstStyle/>
+                    <a:p>
+                      <a:r>
+                        <a:rPr lang="en-US">
+                          <a:effectLst/>
+                        </a:rPr>
+                        <a:t>Anshu Dubey (ANL)</a:t>
+                      </a:r>
+                    </a:p>
+                  </a:txBody>
+                  <a:tcPr marL="142875" marR="142875" marT="95250" marB="95250" anchor="ctr"/>
+                </a:tc>
+                <a:extLst>
+                  <a:ext uri="{0D108BD9-81ED-4DB2-BD59-A6C34878D82A}">
+                    <a16:rowId xmlns:a16="http://schemas.microsoft.com/office/drawing/2014/main" val="3922137579"/>
+                  </a:ext>
+                </a:extLst>
+              </a:tr>
+              <a:tr h="526542">
+                <a:tc>
+                  <a:txBody>
+                    <a:bodyPr/>
+                    <a:lstStyle/>
+                    <a:p>
+                      <a:pPr algn="r"/>
+                      <a:r>
+                        <a:rPr lang="en-US">
+                          <a:effectLst/>
+                        </a:rPr>
+                        <a:t>10:00 AM</a:t>
+                      </a:r>
+                    </a:p>
+                  </a:txBody>
+                  <a:tcPr marL="142875" marR="142875" marT="95250" marB="95250" anchor="ctr"/>
+                </a:tc>
+                <a:tc>
+                  <a:txBody>
+                    <a:bodyPr/>
+                    <a:lstStyle/>
+                    <a:p>
+                      <a:r>
+                        <a:rPr lang="en-US" i="1">
+                          <a:effectLst/>
+                        </a:rPr>
+                        <a:t>Break</a:t>
+                      </a:r>
+                      <a:endParaRPr lang="en-US">
+                        <a:effectLst/>
+                      </a:endParaRPr>
+                    </a:p>
+                  </a:txBody>
+                  <a:tcPr marL="142875" marR="142875" marT="95250" marB="95250" anchor="ctr"/>
+                </a:tc>
+                <a:tc>
+                  <a:txBody>
+                    <a:bodyPr/>
+                    <a:lstStyle/>
+                    <a:p>
+                      <a:endParaRPr lang="en-US">
+                        <a:effectLst/>
+                      </a:endParaRPr>
+                    </a:p>
+                  </a:txBody>
+                  <a:tcPr marL="142875" marR="142875" marT="95250" marB="95250" anchor="ctr"/>
+                </a:tc>
+                <a:extLst>
+                  <a:ext uri="{0D108BD9-81ED-4DB2-BD59-A6C34878D82A}">
+                    <a16:rowId xmlns:a16="http://schemas.microsoft.com/office/drawing/2014/main" val="476507548"/>
+                  </a:ext>
+                </a:extLst>
+              </a:tr>
+              <a:tr h="526542">
+                <a:tc>
+                  <a:txBody>
+                    <a:bodyPr/>
+                    <a:lstStyle/>
+                    <a:p>
+                      <a:pPr algn="r"/>
+                      <a:r>
+                        <a:rPr lang="en-US">
+                          <a:effectLst/>
+                        </a:rPr>
+                        <a:t>10:30 AM</a:t>
+                      </a:r>
+                    </a:p>
+                  </a:txBody>
+                  <a:tcPr marL="142875" marR="142875" marT="95250" marB="95250" anchor="ctr"/>
+                </a:tc>
+                <a:tc>
+                  <a:txBody>
+                    <a:bodyPr/>
+                    <a:lstStyle/>
+                    <a:p>
+                      <a:r>
+                        <a:rPr lang="en-US">
+                          <a:effectLst/>
+                        </a:rPr>
+                        <a:t>Spack: Package Management for HPC</a:t>
+                      </a:r>
+                    </a:p>
+                  </a:txBody>
+                  <a:tcPr marL="142875" marR="142875" marT="95250" marB="95250" anchor="ctr"/>
+                </a:tc>
+                <a:tc>
+                  <a:txBody>
+                    <a:bodyPr/>
+                    <a:lstStyle/>
+                    <a:p>
+                      <a:r>
+                        <a:rPr lang="en-US">
+                          <a:effectLst/>
+                        </a:rPr>
+                        <a:t>Todd Gamblin (LLNL)</a:t>
+                      </a:r>
+                    </a:p>
+                  </a:txBody>
+                  <a:tcPr marL="142875" marR="142875" marT="95250" marB="95250" anchor="ctr"/>
+                </a:tc>
+                <a:extLst>
+                  <a:ext uri="{0D108BD9-81ED-4DB2-BD59-A6C34878D82A}">
+                    <a16:rowId xmlns:a16="http://schemas.microsoft.com/office/drawing/2014/main" val="3487810232"/>
+                  </a:ext>
+                </a:extLst>
+              </a:tr>
+              <a:tr h="526542">
+                <a:tc>
+                  <a:txBody>
+                    <a:bodyPr/>
+                    <a:lstStyle/>
+                    <a:p>
+                      <a:pPr algn="r"/>
+                      <a:r>
+                        <a:rPr lang="en-US">
+                          <a:effectLst/>
+                        </a:rPr>
+                        <a:t>11:30 AM</a:t>
+                      </a:r>
+                    </a:p>
+                  </a:txBody>
+                  <a:tcPr marL="142875" marR="142875" marT="95250" marB="95250" anchor="ctr"/>
+                </a:tc>
+                <a:tc>
+                  <a:txBody>
+                    <a:bodyPr/>
+                    <a:lstStyle/>
+                    <a:p>
+                      <a:r>
+                        <a:rPr lang="en-US">
+                          <a:effectLst/>
+                        </a:rPr>
+                        <a:t>Spack Hands-On</a:t>
+                      </a:r>
+                    </a:p>
+                  </a:txBody>
+                  <a:tcPr marL="142875" marR="142875" marT="95250" marB="95250" anchor="ctr"/>
+                </a:tc>
+                <a:tc>
+                  <a:txBody>
+                    <a:bodyPr/>
+                    <a:lstStyle/>
+                    <a:p>
+                      <a:r>
+                        <a:rPr lang="en-US">
+                          <a:effectLst/>
+                        </a:rPr>
+                        <a:t>Todd Gamblin (LLNL)</a:t>
+                      </a:r>
+                    </a:p>
+                  </a:txBody>
+                  <a:tcPr marL="142875" marR="142875" marT="95250" marB="95250" anchor="ctr"/>
+                </a:tc>
+                <a:extLst>
+                  <a:ext uri="{0D108BD9-81ED-4DB2-BD59-A6C34878D82A}">
+                    <a16:rowId xmlns:a16="http://schemas.microsoft.com/office/drawing/2014/main" val="2034051112"/>
+                  </a:ext>
+                </a:extLst>
+              </a:tr>
+              <a:tr h="526542">
+                <a:tc>
+                  <a:txBody>
+                    <a:bodyPr/>
+                    <a:lstStyle/>
+                    <a:p>
+                      <a:pPr algn="r"/>
+                      <a:r>
+                        <a:rPr lang="en-US">
+                          <a:effectLst/>
+                        </a:rPr>
+                        <a:t>12:30 PM</a:t>
+                      </a:r>
+                    </a:p>
+                  </a:txBody>
+                  <a:tcPr marL="142875" marR="142875" marT="95250" marB="95250" anchor="ctr"/>
+                </a:tc>
+                <a:tc>
+                  <a:txBody>
+                    <a:bodyPr/>
+                    <a:lstStyle/>
+                    <a:p>
+                      <a:r>
+                        <a:rPr lang="en-US" i="1">
+                          <a:effectLst/>
+                        </a:rPr>
+                        <a:t>Lunch</a:t>
+                      </a:r>
+                      <a:endParaRPr lang="en-US">
+                        <a:effectLst/>
+                      </a:endParaRPr>
+                    </a:p>
+                  </a:txBody>
+                  <a:tcPr marL="142875" marR="142875" marT="95250" marB="95250" anchor="ctr"/>
+                </a:tc>
+                <a:tc>
+                  <a:txBody>
+                    <a:bodyPr/>
+                    <a:lstStyle/>
+                    <a:p>
+                      <a:endParaRPr lang="en-US" dirty="0">
+                        <a:effectLst/>
+                      </a:endParaRPr>
+                    </a:p>
+                  </a:txBody>
+                  <a:tcPr marL="142875" marR="142875" marT="95250" marB="95250" anchor="ctr"/>
+                </a:tc>
+                <a:extLst>
+                  <a:ext uri="{0D108BD9-81ED-4DB2-BD59-A6C34878D82A}">
+                    <a16:rowId xmlns:a16="http://schemas.microsoft.com/office/drawing/2014/main" val="1459939263"/>
+                  </a:ext>
+                </a:extLst>
+              </a:tr>
+            </a:tbl>
+          </a:graphicData>
+        </a:graphic>
+      </p:graphicFrame>
+      <p:sp>
+        <p:nvSpPr>
+          <p:cNvPr id="9" name="TextBox 8">
+            <a:extLst>
+              <a:ext uri="{FF2B5EF4-FFF2-40B4-BE49-F238E27FC236}">
+                <a16:creationId xmlns:a16="http://schemas.microsoft.com/office/drawing/2014/main" id="{2C67F121-FA5A-4323-B777-FC3438185944}"/>
+              </a:ext>
+            </a:extLst>
+          </p:cNvPr>
+          <p:cNvSpPr txBox="1"/>
+          <p:nvPr/>
+        </p:nvSpPr>
+        <p:spPr>
+          <a:xfrm>
+            <a:off x="4537710" y="45720"/>
+            <a:ext cx="7651115" cy="646331"/>
+          </a:xfrm>
+          <a:prstGeom prst="rect">
+            <a:avLst/>
+          </a:prstGeom>
+          <a:noFill/>
+        </p:spPr>
+        <p:txBody>
+          <a:bodyPr wrap="square">
+            <a:spAutoFit/>
+          </a:bodyPr>
+          <a:lstStyle/>
+          <a:p>
+            <a:pPr marL="0" marR="0" lvl="0" indent="0" algn="l" defTabSz="914400" rtl="0" eaLnBrk="1" fontAlgn="base" latinLnBrk="0" hangingPunct="1">
+              <a:lnSpc>
+                <a:spcPct val="100000"/>
+              </a:lnSpc>
+              <a:spcBef>
+                <a:spcPct val="0"/>
+              </a:spcBef>
+              <a:spcAft>
+                <a:spcPct val="0"/>
+              </a:spcAft>
+              <a:buClrTx/>
+              <a:buSzTx/>
+              <a:buFontTx/>
+              <a:buNone/>
+              <a:tabLst/>
+              <a:defRPr/>
+            </a:pPr>
+            <a:r>
+              <a:rPr kumimoji="0" lang="en-US" sz="1800" b="0" i="0" u="none" strike="noStrike" kern="1200" cap="none" spc="0" normalizeH="0" baseline="0" noProof="0" dirty="0">
+                <a:ln>
+                  <a:noFill/>
+                </a:ln>
+                <a:solidFill>
+                  <a:prstClr val="black"/>
+                </a:solidFill>
+                <a:effectLst/>
+                <a:uLnTx/>
+                <a:uFillTx/>
+                <a:latin typeface="Arial" charset="0"/>
+                <a:ea typeface="+mn-ea"/>
+                <a:cs typeface="Arial" charset="0"/>
+              </a:rPr>
+              <a:t>The agenda is also available on the tutorial web page.  Visit </a:t>
+            </a:r>
+            <a:r>
+              <a:rPr kumimoji="0" lang="en-US" sz="1800" b="1" i="0" u="none" strike="noStrike" kern="1200" cap="none" spc="0" normalizeH="0" baseline="0" noProof="0" dirty="0">
+                <a:ln>
+                  <a:noFill/>
+                </a:ln>
+                <a:solidFill>
+                  <a:prstClr val="black"/>
+                </a:solidFill>
+                <a:effectLst/>
+                <a:uLnTx/>
+                <a:uFillTx/>
+                <a:latin typeface="Arial" charset="0"/>
+                <a:ea typeface="+mn-ea"/>
+                <a:cs typeface="Arial" charset="0"/>
+                <a:hlinkClick r:id="rId2"/>
+              </a:rPr>
+              <a:t>https://bssw-tutorial.github.io</a:t>
+            </a:r>
+            <a:r>
+              <a:rPr kumimoji="0" lang="en-US" sz="1800" b="1" i="0" u="none" strike="noStrike" kern="1200" cap="none" spc="0" normalizeH="0" baseline="0" noProof="0" dirty="0">
+                <a:ln>
+                  <a:noFill/>
+                </a:ln>
+                <a:solidFill>
+                  <a:prstClr val="black"/>
+                </a:solidFill>
+                <a:effectLst/>
+                <a:uLnTx/>
+                <a:uFillTx/>
+                <a:latin typeface="Arial" charset="0"/>
+                <a:ea typeface="+mn-ea"/>
+                <a:cs typeface="Arial" charset="0"/>
+              </a:rPr>
+              <a:t> </a:t>
+            </a:r>
+            <a:r>
+              <a:rPr kumimoji="0" lang="en-US" sz="1800" b="0" i="0" u="none" strike="noStrike" kern="1200" cap="none" spc="0" normalizeH="0" baseline="0" noProof="0" dirty="0">
+                <a:ln>
+                  <a:noFill/>
+                </a:ln>
+                <a:solidFill>
+                  <a:prstClr val="black"/>
+                </a:solidFill>
+                <a:effectLst/>
+                <a:uLnTx/>
+                <a:uFillTx/>
+                <a:latin typeface="Arial" charset="0"/>
+                <a:ea typeface="+mn-ea"/>
+                <a:cs typeface="Arial" charset="0"/>
+              </a:rPr>
+              <a:t>and click on the link for today’s tutorial</a:t>
+            </a:r>
+          </a:p>
+        </p:txBody>
+      </p:sp>
+    </p:spTree>
+    <p:extLst>
+      <p:ext uri="{BB962C8B-B14F-4D97-AF65-F5344CB8AC3E}">
+        <p14:creationId xmlns:p14="http://schemas.microsoft.com/office/powerpoint/2010/main" val="3643219827"/>
+      </p:ext>
+    </p:extLst>
+  </p:cSld>
+  <p:clrMapOvr>
+    <a:masterClrMapping/>
+  </p:clrMapOvr>
+</p:sld>
+</file>
+
+<file path=ppt/slides/slide11.xml><?xml version="1.0" encoding="utf-8"?>
+<p:sld xmlns:a="http://schemas.openxmlformats.org/drawingml/2006/main" xmlns:r="http://schemas.openxmlformats.org/officeDocument/2006/relationships" xmlns:p="http://schemas.openxmlformats.org/presentationml/2006/main" showMasterSp="0">
+  <p:cSld>
+    <p:spTree>
+      <p:nvGrpSpPr>
+        <p:cNvPr id="1" name=""/>
+        <p:cNvGrpSpPr/>
+        <p:nvPr/>
+      </p:nvGrpSpPr>
+      <p:grpSpPr>
+        <a:xfrm>
+          <a:off x="0" y="0"/>
+          <a:ext cx="0" cy="0"/>
+          <a:chOff x="0" y="0"/>
+          <a:chExt cx="0" cy="0"/>
+        </a:xfrm>
+      </p:grpSpPr>
+      <p:sp>
+        <p:nvSpPr>
+          <p:cNvPr id="2" name="Title 1">
+            <a:extLst>
+              <a:ext uri="{FF2B5EF4-FFF2-40B4-BE49-F238E27FC236}">
+                <a16:creationId xmlns:a16="http://schemas.microsoft.com/office/drawing/2014/main" id="{1D6756EE-C2D9-4E52-B0B6-3C831FD6A565}"/>
+              </a:ext>
+            </a:extLst>
+          </p:cNvPr>
+          <p:cNvSpPr>
+            <a:spLocks noGrp="1"/>
+          </p:cNvSpPr>
+          <p:nvPr>
+            <p:ph type="title"/>
+          </p:nvPr>
+        </p:nvSpPr>
+        <p:spPr>
+          <a:xfrm>
+            <a:off x="408175" y="160020"/>
+            <a:ext cx="11372473" cy="914400"/>
+          </a:xfrm>
+        </p:spPr>
+        <p:txBody>
+          <a:bodyPr/>
+          <a:lstStyle/>
+          <a:p>
+            <a:r>
+              <a:rPr lang="en-US" dirty="0"/>
+              <a:t>Agenda (2/2)</a:t>
+            </a:r>
+          </a:p>
+        </p:txBody>
+      </p:sp>
+      <p:graphicFrame>
+        <p:nvGraphicFramePr>
+          <p:cNvPr id="6" name="Table 6">
+            <a:extLst>
+              <a:ext uri="{FF2B5EF4-FFF2-40B4-BE49-F238E27FC236}">
+                <a16:creationId xmlns:a16="http://schemas.microsoft.com/office/drawing/2014/main" id="{99D13FB2-5BF8-4AC0-A13D-ECB8E230F5BC}"/>
+              </a:ext>
+            </a:extLst>
+          </p:cNvPr>
+          <p:cNvGraphicFramePr>
+            <a:graphicFrameLocks noGrp="1"/>
+          </p:cNvGraphicFramePr>
+          <p:nvPr>
+            <p:ph idx="1"/>
+            <p:extLst>
+              <p:ext uri="{D42A27DB-BD31-4B8C-83A1-F6EECF244321}">
+                <p14:modId xmlns:p14="http://schemas.microsoft.com/office/powerpoint/2010/main" val="207684128"/>
+              </p:ext>
+            </p:extLst>
+          </p:nvPr>
+        </p:nvGraphicFramePr>
+        <p:xfrm>
+          <a:off x="1051560" y="1074420"/>
+          <a:ext cx="9692640" cy="5589270"/>
+        </p:xfrm>
+        <a:graphic>
+          <a:graphicData uri="http://schemas.openxmlformats.org/drawingml/2006/table">
+            <a:tbl>
+              <a:tblPr firstRow="1" bandRow="1">
+                <a:tableStyleId>{5C22544A-7EE6-4342-B048-85BDC9FD1C3A}</a:tableStyleId>
+              </a:tblPr>
+              <a:tblGrid>
+                <a:gridCol w="1328947">
+                  <a:extLst>
+                    <a:ext uri="{9D8B030D-6E8A-4147-A177-3AD203B41FA5}">
+                      <a16:colId xmlns:a16="http://schemas.microsoft.com/office/drawing/2014/main" val="41390910"/>
+                    </a:ext>
+                  </a:extLst>
+                </a:gridCol>
+                <a:gridCol w="5033753">
+                  <a:extLst>
+                    <a:ext uri="{9D8B030D-6E8A-4147-A177-3AD203B41FA5}">
+                      <a16:colId xmlns:a16="http://schemas.microsoft.com/office/drawing/2014/main" val="2092910534"/>
+                    </a:ext>
+                  </a:extLst>
+                </a:gridCol>
+                <a:gridCol w="3329940">
+                  <a:extLst>
+                    <a:ext uri="{9D8B030D-6E8A-4147-A177-3AD203B41FA5}">
+                      <a16:colId xmlns:a16="http://schemas.microsoft.com/office/drawing/2014/main" val="1261297711"/>
+                    </a:ext>
+                  </a:extLst>
+                </a:gridCol>
+              </a:tblGrid>
+              <a:tr h="526542">
+                <a:tc>
+                  <a:txBody>
+                    <a:bodyPr/>
+                    <a:lstStyle/>
+                    <a:p>
+                      <a:pPr algn="r"/>
+                      <a:r>
+                        <a:rPr lang="en-US" sz="1800" dirty="0">
+                          <a:effectLst/>
+                        </a:rPr>
+                        <a:t>Time (CDT)</a:t>
+                      </a:r>
+                    </a:p>
+                  </a:txBody>
+                  <a:tcPr marL="142875" marR="142875" marT="95250" marB="95250" anchor="ctr"/>
+                </a:tc>
+                <a:tc>
+                  <a:txBody>
+                    <a:bodyPr/>
+                    <a:lstStyle/>
+                    <a:p>
+                      <a:pPr algn="l"/>
+                      <a:r>
+                        <a:rPr lang="en-US" sz="1800" dirty="0">
+                          <a:effectLst/>
+                        </a:rPr>
+                        <a:t>Title</a:t>
+                      </a:r>
+                    </a:p>
+                  </a:txBody>
+                  <a:tcPr marL="142875" marR="142875" marT="95250" marB="95250" anchor="ctr"/>
+                </a:tc>
+                <a:tc>
+                  <a:txBody>
+                    <a:bodyPr/>
+                    <a:lstStyle/>
+                    <a:p>
+                      <a:r>
+                        <a:rPr lang="en-US" sz="1800" dirty="0">
+                          <a:effectLst/>
+                        </a:rPr>
+                        <a:t>Presenter</a:t>
+                      </a:r>
+                    </a:p>
+                  </a:txBody>
+                  <a:tcPr marL="142875" marR="142875" marT="95250" marB="95250" anchor="ctr"/>
+                </a:tc>
+                <a:extLst>
+                  <a:ext uri="{0D108BD9-81ED-4DB2-BD59-A6C34878D82A}">
+                    <a16:rowId xmlns:a16="http://schemas.microsoft.com/office/drawing/2014/main" val="2098024418"/>
+                  </a:ext>
+                </a:extLst>
+              </a:tr>
+              <a:tr h="526542">
+                <a:tc>
+                  <a:txBody>
+                    <a:bodyPr/>
+                    <a:lstStyle/>
+                    <a:p>
+                      <a:pPr algn="r"/>
+                      <a:r>
+                        <a:rPr lang="en-US">
+                          <a:effectLst/>
+                        </a:rPr>
+                        <a:t>12:30 PM</a:t>
+                      </a:r>
+                    </a:p>
+                  </a:txBody>
+                  <a:tcPr marL="142875" marR="142875" marT="95250" marB="95250" anchor="ctr"/>
+                </a:tc>
+                <a:tc>
+                  <a:txBody>
+                    <a:bodyPr/>
+                    <a:lstStyle/>
+                    <a:p>
+                      <a:r>
+                        <a:rPr lang="en-US" i="1">
+                          <a:effectLst/>
+                        </a:rPr>
+                        <a:t>Lunch</a:t>
+                      </a:r>
+                      <a:endParaRPr lang="en-US">
+                        <a:effectLst/>
+                      </a:endParaRPr>
+                    </a:p>
+                  </a:txBody>
+                  <a:tcPr marL="142875" marR="142875" marT="95250" marB="95250" anchor="ctr"/>
+                </a:tc>
+                <a:tc>
+                  <a:txBody>
+                    <a:bodyPr/>
+                    <a:lstStyle/>
+                    <a:p>
+                      <a:endParaRPr lang="en-US" dirty="0">
+                        <a:effectLst/>
+                      </a:endParaRPr>
+                    </a:p>
+                  </a:txBody>
+                  <a:tcPr marL="142875" marR="142875" marT="95250" marB="95250" anchor="ctr"/>
+                </a:tc>
+                <a:extLst>
+                  <a:ext uri="{0D108BD9-81ED-4DB2-BD59-A6C34878D82A}">
+                    <a16:rowId xmlns:a16="http://schemas.microsoft.com/office/drawing/2014/main" val="1459939263"/>
                   </a:ext>
                 </a:extLst>
               </a:tr>
@@ -4502,10 +5240,25 @@
                     <a:lstStyle/>
                     <a:p>
                       <a:r>
-                        <a:rPr lang="en-US" dirty="0">
+                        <a:rPr lang="en-US">
                           <a:effectLst/>
                         </a:rPr>
-                        <a:t>Introduction</a:t>
+                        <a:t>Software Testing and Verification</a:t>
+                      </a:r>
+                    </a:p>
+                  </a:txBody>
+                  <a:tcPr marL="142875" marR="142875" marT="95250" marB="95250" anchor="ctr"/>
+                </a:tc>
+                <a:tc>
+                  <a:txBody>
+                    <a:bodyPr/>
+                    <a:lstStyle/>
+                    <a:p>
+                      <a:r>
+                        <a:rPr lang="en-US">
+                          <a:effectLst/>
+                        </a:rPr>
+                        <a:t>Anshu Dubey (ANL)</a:t>
                       </a:r>
                     </a:p>
                   </a:txBody>
@@ -4513,7 +5266,7 @@
                 </a:tc>
                 <a:extLst>
                   <a:ext uri="{0D108BD9-81ED-4DB2-BD59-A6C34878D82A}">
-                    <a16:rowId xmlns:a16="http://schemas.microsoft.com/office/drawing/2014/main" val="110245607"/>
+                    <a16:rowId xmlns:a16="http://schemas.microsoft.com/office/drawing/2014/main" val="568411987"/>
                   </a:ext>
                 </a:extLst>
               </a:tr>
@@ -4528,7 +5281,7 @@
                         <a:rPr lang="en-US">
                           <a:effectLst/>
                         </a:rPr>
-                        <a:t>1:35 PM</a:t>
+                        <a:t>2:30 PM</a:t>
                       </a:r>
                     </a:p>
                   </a:txBody>
@@ -4543,30 +5296,7 @@
                         <a:rPr lang="en-US">
                           <a:effectLst/>
                         </a:rPr>
-                        <a:t>Improving Reproducibility Through Better Software Practices</a:t>
-                      </a:r>
-                    </a:p>
-                  </a:txBody>
-                  <a:tcPr marL="142875" marR="142875" marT="95250" marB="95250" anchor="ctr"/>
-                </a:tc>
-                <a:extLst>
-                  <a:ext uri="{0D108BD9-81ED-4DB2-BD59-A6C34878D82A}">
-                    <a16:rowId xmlns:a16="http://schemas.microsoft.com/office/drawing/2014/main" val="1951011699"/>
-                  </a:ext>
-                </a:extLst>
-              </a:tr>
-              <a:tr h="526542">
-                <a:tc>
-                  <a:txBody>
-                    <a:bodyPr/>
-                    <a:lstStyle/>
-                    <a:p>
-                      <a:pPr algn="r"/>
-                      <a:r>
-                        <a:rPr lang="en-US">
-                          <a:effectLst/>
-                        </a:rPr>
-                        <a:t>2:15 PM</a:t>
+                        <a:t>Refactoring Scientific Software</a:t>
                       </a:r>
                     </a:p>
                   </a:txBody>
@@ -4581,7 +5311,7 @@
                         <a:rPr lang="en-US">
                           <a:effectLst/>
                         </a:rPr>
-                        <a:t>Software Testing and Verification</a:t>
+                        <a:t>Anshu Dubey (ANL)</a:t>
                       </a:r>
                     </a:p>
                   </a:txBody>
@@ -4589,7 +5319,7 @@
                 </a:tc>
                 <a:extLst>
                   <a:ext uri="{0D108BD9-81ED-4DB2-BD59-A6C34878D82A}">
-                    <a16:rowId xmlns:a16="http://schemas.microsoft.com/office/drawing/2014/main" val="333202538"/>
+                    <a16:rowId xmlns:a16="http://schemas.microsoft.com/office/drawing/2014/main" val="439333682"/>
                   </a:ext>
                 </a:extLst>
               </a:tr>
@@ -4619,8 +5349,20 @@
                         <a:rPr lang="en-US" i="1">
                           <a:effectLst/>
                         </a:rPr>
-                        <a:t>Afternoon break</a:t>
+                        <a:t>Break</a:t>
                       </a:r>
+                      <a:endParaRPr lang="en-US">
+                        <a:effectLst/>
+                      </a:endParaRPr>
+                    </a:p>
+                  </a:txBody>
+                  <a:tcPr marL="142875" marR="142875" marT="95250" marB="95250" anchor="ctr"/>
+                </a:tc>
+                <a:tc>
+                  <a:txBody>
+                    <a:bodyPr/>
+                    <a:lstStyle/>
+                    <a:p>
                       <a:endParaRPr lang="en-US">
                         <a:effectLst/>
                       </a:endParaRPr>
@@ -4630,7 +5372,7 @@
                 </a:tc>
                 <a:extLst>
                   <a:ext uri="{0D108BD9-81ED-4DB2-BD59-A6C34878D82A}">
-                    <a16:rowId xmlns:a16="http://schemas.microsoft.com/office/drawing/2014/main" val="902307701"/>
+                    <a16:rowId xmlns:a16="http://schemas.microsoft.com/office/drawing/2014/main" val="3500361090"/>
                   </a:ext>
                 </a:extLst>
               </a:tr>
@@ -4660,7 +5402,22 @@
                         <a:rPr lang="en-US">
                           <a:effectLst/>
                         </a:rPr>
-                        <a:t>Managing Computational Experiments</a:t>
+                        <a:t>Software Licensing</a:t>
+                      </a:r>
+                    </a:p>
+                  </a:txBody>
+                  <a:tcPr marL="142875" marR="142875" marT="95250" marB="95250" anchor="ctr"/>
+                </a:tc>
+                <a:tc>
+                  <a:txBody>
+                    <a:bodyPr/>
+                    <a:lstStyle/>
+                    <a:p>
+                      <a:r>
+                        <a:rPr lang="en-US">
+                          <a:effectLst/>
+                        </a:rPr>
+                        <a:t>David E. Bernholdt (ORNL) and Todd Gamblin (LLNL)</a:t>
                       </a:r>
                     </a:p>
                   </a:txBody>
@@ -4668,7 +5425,7 @@
                 </a:tc>
                 <a:extLst>
                   <a:ext uri="{0D108BD9-81ED-4DB2-BD59-A6C34878D82A}">
-                    <a16:rowId xmlns:a16="http://schemas.microsoft.com/office/drawing/2014/main" val="2705533259"/>
+                    <a16:rowId xmlns:a16="http://schemas.microsoft.com/office/drawing/2014/main" val="1733344417"/>
                   </a:ext>
                 </a:extLst>
               </a:tr>
@@ -4698,7 +5455,22 @@
                         <a:rPr lang="en-US">
                           <a:effectLst/>
                         </a:rPr>
-                        <a:t>Reproducibility of Workflows</a:t>
+                        <a:t>Improving Reproducibility Through Better Software Practices</a:t>
+                      </a:r>
+                    </a:p>
+                  </a:txBody>
+                  <a:tcPr marL="142875" marR="142875" marT="95250" marB="95250" anchor="ctr"/>
+                </a:tc>
+                <a:tc>
+                  <a:txBody>
+                    <a:bodyPr/>
+                    <a:lstStyle/>
+                    <a:p>
+                      <a:r>
+                        <a:rPr lang="en-US" dirty="0">
+                          <a:effectLst/>
+                        </a:rPr>
+                        <a:t>David E. Bernholdt (ORNL)</a:t>
                       </a:r>
                     </a:p>
                   </a:txBody>
@@ -4706,7 +5478,7 @@
                 </a:tc>
                 <a:extLst>
                   <a:ext uri="{0D108BD9-81ED-4DB2-BD59-A6C34878D82A}">
-                    <a16:rowId xmlns:a16="http://schemas.microsoft.com/office/drawing/2014/main" val="1166125975"/>
+                    <a16:rowId xmlns:a16="http://schemas.microsoft.com/office/drawing/2014/main" val="1855854553"/>
                   </a:ext>
                 </a:extLst>
               </a:tr>
@@ -4721,7 +5493,7 @@
                         <a:rPr lang="en-US">
                           <a:effectLst/>
                         </a:rPr>
-                        <a:t>5:00 PM</a:t>
+                        <a:t>5:30 PM</a:t>
                       </a:r>
                     </a:p>
                   </a:txBody>
@@ -4733,21 +5505,84 @@
                     <a:lstStyle/>
                     <a:p>
                       <a:r>
-                        <a:rPr lang="en-US" i="1" dirty="0">
+                        <a:rPr lang="en-US">
+                          <a:effectLst/>
+                        </a:rPr>
+                        <a:t>Lab Notebooks for Computational Mathematics, Sciences, &amp; Engineering</a:t>
+                      </a:r>
+                    </a:p>
+                  </a:txBody>
+                  <a:tcPr marL="142875" marR="142875" marT="95250" marB="95250" anchor="ctr"/>
+                </a:tc>
+                <a:tc>
+                  <a:txBody>
+                    <a:bodyPr/>
+                    <a:lstStyle/>
+                    <a:p>
+                      <a:r>
+                        <a:rPr lang="en-US">
+                          <a:effectLst/>
+                        </a:rPr>
+                        <a:t>Jared O'Neal (ANL)</a:t>
+                      </a:r>
+                    </a:p>
+                  </a:txBody>
+                  <a:tcPr marL="142875" marR="142875" marT="95250" marB="95250" anchor="ctr"/>
+                </a:tc>
+                <a:extLst>
+                  <a:ext uri="{0D108BD9-81ED-4DB2-BD59-A6C34878D82A}">
+                    <a16:rowId xmlns:a16="http://schemas.microsoft.com/office/drawing/2014/main" val="2122309219"/>
+                  </a:ext>
+                </a:extLst>
+              </a:tr>
+              <a:tr h="526542">
+                <a:tc>
+                  <a:txBody>
+                    <a:bodyPr/>
+                    <a:lstStyle/>
+                    <a:p>
+                      <a:pPr algn="r"/>
+                      <a:r>
+                        <a:rPr lang="en-US">
+                          <a:effectLst/>
+                        </a:rPr>
+                        <a:t>6:30 PM</a:t>
+                      </a:r>
+                    </a:p>
+                  </a:txBody>
+                  <a:tcPr marL="142875" marR="142875" marT="95250" marB="95250" anchor="ctr"/>
+                </a:tc>
+                <a:tc>
+                  <a:txBody>
+                    <a:bodyPr/>
+                    <a:lstStyle/>
+                    <a:p>
+                      <a:r>
+                        <a:rPr lang="en-US" i="1">
                           <a:effectLst/>
                         </a:rPr>
                         <a:t>Adjourn</a:t>
                       </a:r>
-                      <a:endParaRPr lang="en-US" dirty="0">
+                      <a:endParaRPr lang="en-US">
                         <a:effectLst/>
                       </a:endParaRPr>
                     </a:p>
                   </a:txBody>
                   <a:tcPr marL="142875" marR="142875" marT="95250" marB="95250" anchor="ctr"/>
                 </a:tc>
+                <a:tc>
+                  <a:txBody>
+                    <a:bodyPr/>
+                    <a:lstStyle/>
+                    <a:p>
+                      <a:endParaRPr lang="en-US" dirty="0"/>
+                    </a:p>
+                  </a:txBody>
+                  <a:tcPr/>
+                </a:tc>
                 <a:extLst>
                   <a:ext uri="{0D108BD9-81ED-4DB2-BD59-A6C34878D82A}">
-                    <a16:rowId xmlns:a16="http://schemas.microsoft.com/office/drawing/2014/main" val="4002252475"/>
+                    <a16:rowId xmlns:a16="http://schemas.microsoft.com/office/drawing/2014/main" val="3774671062"/>
                   </a:ext>
                 </a:extLst>
               </a:tr>
@@ -5269,7 +6104,7 @@
             </a:pPr>
             <a:r>
               <a:rPr lang="en-US" dirty="0"/>
-              <a:t>Anshu Dubey, ANL</a:t>
+              <a:t>David E. Bernholdt, ORNL</a:t>
             </a:r>
           </a:p>
           <a:p>
@@ -5280,7 +6115,29 @@
             </a:pPr>
             <a:r>
               <a:rPr lang="en-US" dirty="0"/>
-              <a:t>Gregory R. Watson, ORNL</a:t>
+              <a:t>Anshu Dubey, ANL</a:t>
+            </a:r>
+          </a:p>
+          <a:p>
+            <a:pPr>
+              <a:spcBef>
+                <a:spcPts val="1000"/>
+              </a:spcBef>
+            </a:pPr>
+            <a:r>
+              <a:rPr lang="en-US" dirty="0"/>
+              <a:t>Todd Gamblin, LLNL</a:t>
+            </a:r>
+          </a:p>
+          <a:p>
+            <a:pPr>
+              <a:spcBef>
+                <a:spcPts val="1000"/>
+              </a:spcBef>
+            </a:pPr>
+            <a:r>
+              <a:rPr lang="en-US" dirty="0"/>
+              <a:t>Jared O’Neal, ANL</a:t>
             </a:r>
           </a:p>
           <a:p>
@@ -5337,7 +6194,7 @@
         <p:spPr>
           <a:xfrm>
             <a:off x="453256" y="3373816"/>
-            <a:ext cx="10123321" cy="2862322"/>
+            <a:ext cx="10123321" cy="2708434"/>
           </a:xfrm>
           <a:prstGeom prst="rect">
             <a:avLst/>
@@ -5359,234 +6216,96 @@
             </a:pPr>
             <a:r>
               <a:rPr lang="en-US" sz="2000" dirty="0"/>
-              <a:t>Anshu </a:t>
-            </a:r>
-          </a:p>
-          <a:p>
-            <a:pPr marL="684213" lvl="1" indent="-227013">
+              <a:t>Participants in the Consortium for the Advancement of Scientific Software (CASS) and DOE/ASCR software stewardship projects: </a:t>
+            </a:r>
+            <a:r>
+              <a:rPr lang="en-US" sz="2000" dirty="0">
+                <a:hlinkClick r:id="rId2"/>
+              </a:rPr>
+              <a:t>https://cass.community/</a:t>
+            </a:r>
+            <a:endParaRPr lang="en-US" sz="2000" dirty="0"/>
+          </a:p>
+          <a:p>
+            <a:pPr marL="227013" indent="-227013">
               <a:spcBef>
-                <a:spcPts val="0"/>
+                <a:spcPts val="1800"/>
               </a:spcBef>
               <a:buFont typeface="Arial" panose="020B0604020202020204" pitchFamily="34" charset="0"/>
               <a:buChar char="•"/>
             </a:pPr>
             <a:r>
               <a:rPr lang="en-US" sz="2000" dirty="0"/>
-              <a:t>Lead PI for COLABS: Collaboration for Better Software for Science</a:t>
-            </a:r>
-          </a:p>
-          <a:p>
-            <a:pPr marL="684213" lvl="1" indent="-227013">
+              <a:t>Members of the IDEAS Productivity family of projects: </a:t>
+            </a:r>
+            <a:r>
+              <a:rPr lang="en-US" sz="2000" dirty="0">
+                <a:hlinkClick r:id="rId3"/>
+              </a:rPr>
+              <a:t>https://ideas-productivity.org/</a:t>
+            </a:r>
+            <a:endParaRPr lang="en-US" sz="2000" dirty="0"/>
+          </a:p>
+          <a:p>
+            <a:pPr marL="227013" indent="-227013">
               <a:spcBef>
-                <a:spcPts val="0"/>
+                <a:spcPts val="1800"/>
               </a:spcBef>
               <a:buFont typeface="Arial" panose="020B0604020202020204" pitchFamily="34" charset="0"/>
               <a:buChar char="•"/>
             </a:pPr>
             <a:r>
               <a:rPr lang="en-US" sz="2000" dirty="0"/>
-              <a:t>Application Engagement Lead for the RAPIDS </a:t>
-            </a:r>
-            <a:r>
-              <a:rPr lang="en-US" sz="2000" dirty="0" err="1"/>
-              <a:t>SciDAC</a:t>
+              <a:t>Lead for the Spack project: </a:t>
+            </a:r>
+            <a:r>
+              <a:rPr lang="en-US" sz="2000" dirty="0">
+                <a:hlinkClick r:id="rId4"/>
+              </a:rPr>
+              <a:t>https://spack.io/</a:t>
             </a:r>
             <a:r>
               <a:rPr lang="en-US" sz="2000" dirty="0"/>
-              <a:t> Institute</a:t>
-            </a:r>
-          </a:p>
-          <a:p>
-            <a:pPr marL="684213" lvl="1" indent="-227013">
+              <a:t> (Todd)</a:t>
+            </a:r>
+          </a:p>
+          <a:p>
+            <a:pPr marL="227013" indent="-227013">
               <a:spcBef>
-                <a:spcPts val="0"/>
+                <a:spcPts val="1800"/>
               </a:spcBef>
               <a:buFont typeface="Arial" panose="020B0604020202020204" pitchFamily="34" charset="0"/>
               <a:buChar char="•"/>
             </a:pPr>
             <a:r>
               <a:rPr lang="en-US" sz="2000" dirty="0"/>
-              <a:t>Member of the IDEAS Productivity Project: </a:t>
-            </a:r>
-            <a:r>
-              <a:rPr lang="en-US" sz="2000" dirty="0">
-                <a:hlinkClick r:id="rId2"/>
-              </a:rPr>
-              <a:t>http://ideas-productivity.org</a:t>
-            </a:r>
-            <a:endParaRPr lang="en-US" sz="2000" dirty="0"/>
-          </a:p>
-          <a:p>
-            <a:pPr marL="227013" indent="-227013">
+              <a:t>Also…</a:t>
+            </a:r>
+          </a:p>
+          <a:p>
+            <a:pPr marL="684213" lvl="1" indent="-227013">
               <a:spcBef>
-                <a:spcPts val="0"/>
+                <a:spcPts val="600"/>
               </a:spcBef>
               <a:buFont typeface="Arial" panose="020B0604020202020204" pitchFamily="34" charset="0"/>
               <a:buChar char="•"/>
             </a:pPr>
             <a:r>
+              <a:rPr lang="en-US" sz="2000" dirty="0" err="1"/>
+              <a:t>SciDAC</a:t>
+            </a:r>
+            <a:r>
               <a:rPr lang="en-US" sz="2000" dirty="0"/>
-              <a:t>Greg</a:t>
-            </a:r>
-          </a:p>
-          <a:p>
-            <a:pPr marL="684213" lvl="1" indent="-227013">
-              <a:spcBef>
-                <a:spcPts val="0"/>
-              </a:spcBef>
-              <a:buFont typeface="Arial" panose="020B0604020202020204" pitchFamily="34" charset="0"/>
-              <a:buChar char="•"/>
-            </a:pPr>
-            <a:r>
-              <a:rPr lang="en-US" sz="2000" dirty="0"/>
-              <a:t>PI for CORSA: Center for Open-Source Research Software Advancement (</a:t>
-            </a:r>
-            <a:r>
-              <a:rPr lang="en-US" sz="2000" dirty="0">
-                <a:hlinkClick r:id="rId3"/>
-              </a:rPr>
-              <a:t>https://corsa.center</a:t>
-            </a:r>
-            <a:r>
-              <a:rPr lang="en-US" sz="2000" dirty="0"/>
-              <a:t>)</a:t>
-            </a:r>
-          </a:p>
-          <a:p>
-            <a:pPr marL="684213" lvl="1" indent="-227013">
-              <a:spcBef>
-                <a:spcPts val="0"/>
-              </a:spcBef>
-              <a:buFont typeface="Arial" panose="020B0604020202020204" pitchFamily="34" charset="0"/>
-              <a:buChar char="•"/>
-            </a:pPr>
-            <a:r>
-              <a:rPr lang="en-US" sz="2000" dirty="0"/>
-              <a:t>PI for the Neutrons Data Interpretation Platform project (ORNL)</a:t>
-            </a:r>
-          </a:p>
-          <a:p>
-            <a:pPr marL="684213" lvl="1" indent="-227013">
-              <a:spcBef>
-                <a:spcPts val="0"/>
-              </a:spcBef>
-              <a:buFont typeface="Arial" panose="020B0604020202020204" pitchFamily="34" charset="0"/>
-              <a:buChar char="•"/>
-            </a:pPr>
-            <a:r>
-              <a:rPr lang="en-US" sz="2000" dirty="0"/>
-              <a:t>Co-PI for the NZ-ARMADA project (ORNL)</a:t>
-            </a:r>
+              <a:t> RAPIDS Institute, fusion energy sciences projects, </a:t>
+            </a:r>
+            <a:r>
+              <a:rPr lang="en-US" sz="2000"/>
+              <a:t>and others</a:t>
+            </a:r>
+            <a:endParaRPr lang="en-US" sz="2000" dirty="0"/>
           </a:p>
         </p:txBody>
       </p:sp>
-      <p:grpSp>
-        <p:nvGrpSpPr>
-          <p:cNvPr id="5" name="Group 4">
-            <a:extLst>
-              <a:ext uri="{FF2B5EF4-FFF2-40B4-BE49-F238E27FC236}">
-                <a16:creationId xmlns:a16="http://schemas.microsoft.com/office/drawing/2014/main" id="{3D009C9C-7569-AE4A-AB05-5A2D29A31C40}"/>
-              </a:ext>
-            </a:extLst>
-          </p:cNvPr>
-          <p:cNvGrpSpPr/>
-          <p:nvPr/>
-        </p:nvGrpSpPr>
-        <p:grpSpPr>
-          <a:xfrm>
-            <a:off x="7765265" y="1427736"/>
-            <a:ext cx="1038027" cy="1804941"/>
-            <a:chOff x="9222950" y="1485878"/>
-            <a:chExt cx="1038027" cy="1804941"/>
-          </a:xfrm>
-        </p:grpSpPr>
-        <p:pic>
-          <p:nvPicPr>
-            <p:cNvPr id="6" name="Picture 5" descr="A person wearing a hat&#10;&#10;Description automatically generated with medium confidence">
-              <a:extLst>
-                <a:ext uri="{FF2B5EF4-FFF2-40B4-BE49-F238E27FC236}">
-                  <a16:creationId xmlns:a16="http://schemas.microsoft.com/office/drawing/2014/main" id="{FD3F4FE7-F5B1-8BFB-24C4-F3D5551ECB92}"/>
-                </a:ext>
-              </a:extLst>
-            </p:cNvPr>
-            <p:cNvPicPr>
-              <a:picLocks noChangeAspect="1"/>
-            </p:cNvPicPr>
-            <p:nvPr/>
-          </p:nvPicPr>
-          <p:blipFill rotWithShape="1">
-            <a:blip r:embed="rId4">
-              <a:extLst>
-                <a:ext uri="{28A0092B-C50C-407E-A947-70E740481C1C}">
-                  <a14:useLocalDpi xmlns:a14="http://schemas.microsoft.com/office/drawing/2010/main" val="0"/>
-                </a:ext>
-              </a:extLst>
-            </a:blip>
-            <a:srcRect l="7000" t="-1515" r="7000" b="1515"/>
-            <a:stretch/>
-          </p:blipFill>
-          <p:spPr>
-            <a:xfrm>
-              <a:off x="9222950" y="1485878"/>
-              <a:ext cx="1038027" cy="1207008"/>
-            </a:xfrm>
-            <a:prstGeom prst="rect">
-              <a:avLst/>
-            </a:prstGeom>
-          </p:spPr>
-        </p:pic>
-        <p:sp>
-          <p:nvSpPr>
-            <p:cNvPr id="7" name="TextBox 6">
-              <a:extLst>
-                <a:ext uri="{FF2B5EF4-FFF2-40B4-BE49-F238E27FC236}">
-                  <a16:creationId xmlns:a16="http://schemas.microsoft.com/office/drawing/2014/main" id="{1399CAD7-0E59-DED6-C82F-315923010743}"/>
-                </a:ext>
-              </a:extLst>
-            </p:cNvPr>
-            <p:cNvSpPr txBox="1"/>
-            <p:nvPr/>
-          </p:nvSpPr>
-          <p:spPr>
-            <a:xfrm>
-              <a:off x="9252085" y="2699888"/>
-              <a:ext cx="979756" cy="590931"/>
-            </a:xfrm>
-            <a:prstGeom prst="rect">
-              <a:avLst/>
-            </a:prstGeom>
-            <a:noFill/>
-          </p:spPr>
-          <p:txBody>
-            <a:bodyPr wrap="none" rtlCol="0">
-              <a:spAutoFit/>
-            </a:bodyPr>
-            <a:lstStyle/>
-            <a:p>
-              <a:pPr algn="ctr">
-                <a:lnSpc>
-                  <a:spcPct val="90000"/>
-                </a:lnSpc>
-              </a:pPr>
-              <a:r>
-                <a:rPr lang="en-US" dirty="0"/>
-                <a:t>Greg W</a:t>
-              </a:r>
-            </a:p>
-            <a:p>
-              <a:pPr algn="ctr">
-                <a:lnSpc>
-                  <a:spcPct val="90000"/>
-                </a:lnSpc>
-              </a:pPr>
-              <a:r>
-                <a:rPr lang="en-US" i="1" dirty="0"/>
-                <a:t>he/him</a:t>
-              </a:r>
-            </a:p>
-          </p:txBody>
-        </p:sp>
-      </p:grpSp>
       <p:grpSp>
         <p:nvGrpSpPr>
           <p:cNvPr id="8" name="Group 7">
@@ -5601,7 +6320,7 @@
         </p:nvGrpSpPr>
         <p:grpSpPr>
           <a:xfrm>
-            <a:off x="6094412" y="1427736"/>
+            <a:off x="6631399" y="1409942"/>
             <a:ext cx="954107" cy="1805497"/>
             <a:chOff x="6614147" y="1346049"/>
             <a:chExt cx="954107" cy="1805497"/>
@@ -5694,6 +6413,327 @@
             </a:prstGeom>
           </p:spPr>
         </p:pic>
+      </p:grpSp>
+      <p:grpSp>
+        <p:nvGrpSpPr>
+          <p:cNvPr id="11" name="Group 10">
+            <a:extLst>
+              <a:ext uri="{FF2B5EF4-FFF2-40B4-BE49-F238E27FC236}">
+                <a16:creationId xmlns:a16="http://schemas.microsoft.com/office/drawing/2014/main" id="{BF360452-D7C7-247A-386F-D3315474AFCB}"/>
+              </a:ext>
+            </a:extLst>
+          </p:cNvPr>
+          <p:cNvGrpSpPr/>
+          <p:nvPr/>
+        </p:nvGrpSpPr>
+        <p:grpSpPr>
+          <a:xfrm>
+            <a:off x="5015805" y="1409942"/>
+            <a:ext cx="1038027" cy="1797939"/>
+            <a:chOff x="4187619" y="4211394"/>
+            <a:chExt cx="1038027" cy="1797939"/>
+          </a:xfrm>
+        </p:grpSpPr>
+        <p:pic>
+          <p:nvPicPr>
+            <p:cNvPr id="12" name="Picture 11" descr="A person wearing glasses&#10;&#10;Description automatically generated with low confidence">
+              <a:extLst>
+                <a:ext uri="{FF2B5EF4-FFF2-40B4-BE49-F238E27FC236}">
+                  <a16:creationId xmlns:a16="http://schemas.microsoft.com/office/drawing/2014/main" id="{8B9A3899-C96B-3A08-5E0A-2906D305F982}"/>
+                </a:ext>
+              </a:extLst>
+            </p:cNvPr>
+            <p:cNvPicPr>
+              <a:picLocks noChangeAspect="1"/>
+            </p:cNvPicPr>
+            <p:nvPr/>
+          </p:nvPicPr>
+          <p:blipFill rotWithShape="1">
+            <a:blip r:embed="rId6" cstate="print">
+              <a:extLst>
+                <a:ext uri="{28A0092B-C50C-407E-A947-70E740481C1C}">
+                  <a14:useLocalDpi xmlns:a14="http://schemas.microsoft.com/office/drawing/2010/main" val="0"/>
+                </a:ext>
+              </a:extLst>
+            </a:blip>
+            <a:srcRect l="8053" t="854" r="5947" b="-854"/>
+            <a:stretch/>
+          </p:blipFill>
+          <p:spPr>
+            <a:xfrm>
+              <a:off x="4187619" y="4211394"/>
+              <a:ext cx="1038027" cy="1207008"/>
+            </a:xfrm>
+            <a:prstGeom prst="rect">
+              <a:avLst/>
+            </a:prstGeom>
+          </p:spPr>
+        </p:pic>
+        <p:sp>
+          <p:nvSpPr>
+            <p:cNvPr id="13" name="TextBox 12">
+              <a:extLst>
+                <a:ext uri="{FF2B5EF4-FFF2-40B4-BE49-F238E27FC236}">
+                  <a16:creationId xmlns:a16="http://schemas.microsoft.com/office/drawing/2014/main" id="{2B5EF80D-04B1-F98E-6FF3-532C3F5A9955}"/>
+                </a:ext>
+              </a:extLst>
+            </p:cNvPr>
+            <p:cNvSpPr txBox="1"/>
+            <p:nvPr/>
+          </p:nvSpPr>
+          <p:spPr>
+            <a:xfrm>
+              <a:off x="4268051" y="5418402"/>
+              <a:ext cx="877163" cy="590931"/>
+            </a:xfrm>
+            <a:prstGeom prst="rect">
+              <a:avLst/>
+            </a:prstGeom>
+            <a:noFill/>
+          </p:spPr>
+          <p:txBody>
+            <a:bodyPr wrap="none" rtlCol="0">
+              <a:spAutoFit/>
+            </a:bodyPr>
+            <a:lstStyle/>
+            <a:p>
+              <a:pPr algn="ctr">
+                <a:lnSpc>
+                  <a:spcPct val="90000"/>
+                </a:lnSpc>
+              </a:pPr>
+              <a:r>
+                <a:rPr lang="en-US" dirty="0"/>
+                <a:t>David</a:t>
+              </a:r>
+            </a:p>
+            <a:p>
+              <a:pPr algn="ctr">
+                <a:lnSpc>
+                  <a:spcPct val="90000"/>
+                </a:lnSpc>
+              </a:pPr>
+              <a:r>
+                <a:rPr lang="en-US" i="1" dirty="0"/>
+                <a:t>he/him</a:t>
+              </a:r>
+            </a:p>
+          </p:txBody>
+        </p:sp>
+      </p:grpSp>
+      <p:grpSp>
+        <p:nvGrpSpPr>
+          <p:cNvPr id="14" name="Group 13">
+            <a:extLst>
+              <a:ext uri="{FF2B5EF4-FFF2-40B4-BE49-F238E27FC236}">
+                <a16:creationId xmlns:a16="http://schemas.microsoft.com/office/drawing/2014/main" id="{92E18724-E093-2905-5995-FA9656E78542}"/>
+              </a:ext>
+            </a:extLst>
+          </p:cNvPr>
+          <p:cNvGrpSpPr/>
+          <p:nvPr/>
+        </p:nvGrpSpPr>
+        <p:grpSpPr>
+          <a:xfrm>
+            <a:off x="9788549" y="1422618"/>
+            <a:ext cx="1038027" cy="1797939"/>
+            <a:chOff x="9605157" y="3871568"/>
+            <a:chExt cx="1038027" cy="1797939"/>
+          </a:xfrm>
+        </p:grpSpPr>
+        <p:pic>
+          <p:nvPicPr>
+            <p:cNvPr id="15" name="Picture 14" descr="A person wearing glasses&#10;&#10;Description automatically generated with medium confidence">
+              <a:extLst>
+                <a:ext uri="{FF2B5EF4-FFF2-40B4-BE49-F238E27FC236}">
+                  <a16:creationId xmlns:a16="http://schemas.microsoft.com/office/drawing/2014/main" id="{AC87CD00-A786-7297-BAC2-1B3274862CBE}"/>
+                </a:ext>
+              </a:extLst>
+            </p:cNvPr>
+            <p:cNvPicPr>
+              <a:picLocks noChangeAspect="1"/>
+            </p:cNvPicPr>
+            <p:nvPr/>
+          </p:nvPicPr>
+          <p:blipFill rotWithShape="1">
+            <a:blip r:embed="rId7" cstate="print">
+              <a:extLst>
+                <a:ext uri="{28A0092B-C50C-407E-A947-70E740481C1C}">
+                  <a14:useLocalDpi xmlns:a14="http://schemas.microsoft.com/office/drawing/2010/main" val="0"/>
+                </a:ext>
+              </a:extLst>
+            </a:blip>
+            <a:srcRect l="4297" r="9701"/>
+            <a:stretch/>
+          </p:blipFill>
+          <p:spPr>
+            <a:xfrm>
+              <a:off x="9605157" y="3871568"/>
+              <a:ext cx="1038027" cy="1207008"/>
+            </a:xfrm>
+            <a:prstGeom prst="rect">
+              <a:avLst/>
+            </a:prstGeom>
+          </p:spPr>
+        </p:pic>
+        <p:sp>
+          <p:nvSpPr>
+            <p:cNvPr id="16" name="TextBox 15">
+              <a:extLst>
+                <a:ext uri="{FF2B5EF4-FFF2-40B4-BE49-F238E27FC236}">
+                  <a16:creationId xmlns:a16="http://schemas.microsoft.com/office/drawing/2014/main" id="{C3725BF0-247B-D09D-AEBA-487D7AFA3C92}"/>
+                </a:ext>
+              </a:extLst>
+            </p:cNvPr>
+            <p:cNvSpPr txBox="1"/>
+            <p:nvPr/>
+          </p:nvSpPr>
+          <p:spPr>
+            <a:xfrm>
+              <a:off x="9685588" y="5078576"/>
+              <a:ext cx="877164" cy="590931"/>
+            </a:xfrm>
+            <a:prstGeom prst="rect">
+              <a:avLst/>
+            </a:prstGeom>
+            <a:noFill/>
+          </p:spPr>
+          <p:txBody>
+            <a:bodyPr wrap="none" rtlCol="0">
+              <a:spAutoFit/>
+            </a:bodyPr>
+            <a:lstStyle/>
+            <a:p>
+              <a:pPr algn="ctr">
+                <a:lnSpc>
+                  <a:spcPct val="90000"/>
+                </a:lnSpc>
+              </a:pPr>
+              <a:r>
+                <a:rPr lang="en-US" dirty="0"/>
+                <a:t>Jared</a:t>
+              </a:r>
+            </a:p>
+            <a:p>
+              <a:pPr algn="ctr">
+                <a:lnSpc>
+                  <a:spcPct val="90000"/>
+                </a:lnSpc>
+              </a:pPr>
+              <a:r>
+                <a:rPr lang="en-US" i="1" dirty="0"/>
+                <a:t>he/him</a:t>
+              </a:r>
+            </a:p>
+          </p:txBody>
+        </p:sp>
+      </p:grpSp>
+      <p:grpSp>
+        <p:nvGrpSpPr>
+          <p:cNvPr id="17" name="Group 16">
+            <a:extLst>
+              <a:ext uri="{FF2B5EF4-FFF2-40B4-BE49-F238E27FC236}">
+                <a16:creationId xmlns:a16="http://schemas.microsoft.com/office/drawing/2014/main" id="{B5FBC002-EA63-3AA1-A9F0-19BC36D2DD4E}"/>
+              </a:ext>
+            </a:extLst>
+          </p:cNvPr>
+          <p:cNvGrpSpPr/>
+          <p:nvPr/>
+        </p:nvGrpSpPr>
+        <p:grpSpPr>
+          <a:xfrm>
+            <a:off x="8177064" y="1422618"/>
+            <a:ext cx="1021881" cy="1792821"/>
+            <a:chOff x="10957831" y="1197414"/>
+            <a:chExt cx="1021881" cy="1792821"/>
+          </a:xfrm>
+        </p:grpSpPr>
+        <p:pic>
+          <p:nvPicPr>
+            <p:cNvPr id="18" name="Picture 17" descr="A person smiling for the camera&#10;&#10;Description automatically generated with medium confidence">
+              <a:extLst>
+                <a:ext uri="{FF2B5EF4-FFF2-40B4-BE49-F238E27FC236}">
+                  <a16:creationId xmlns:a16="http://schemas.microsoft.com/office/drawing/2014/main" id="{C611DBA7-7F94-A867-D486-31027D33AC75}"/>
+                </a:ext>
+              </a:extLst>
+            </p:cNvPr>
+            <p:cNvPicPr>
+              <a:picLocks noChangeAspect="1"/>
+            </p:cNvPicPr>
+            <p:nvPr/>
+          </p:nvPicPr>
+          <p:blipFill rotWithShape="1">
+            <a:blip r:embed="rId8" cstate="print">
+              <a:extLst>
+                <a:ext uri="{28A0092B-C50C-407E-A947-70E740481C1C}">
+                  <a14:useLocalDpi xmlns:a14="http://schemas.microsoft.com/office/drawing/2010/main" val="0"/>
+                </a:ext>
+              </a:extLst>
+            </a:blip>
+            <a:srcRect l="6373" r="8964"/>
+            <a:stretch/>
+          </p:blipFill>
+          <p:spPr>
+            <a:xfrm>
+              <a:off x="10957831" y="1197414"/>
+              <a:ext cx="1021881" cy="1207008"/>
+            </a:xfrm>
+            <a:prstGeom prst="rect">
+              <a:avLst/>
+            </a:prstGeom>
+          </p:spPr>
+        </p:pic>
+        <p:sp>
+          <p:nvSpPr>
+            <p:cNvPr id="19" name="TextBox 18">
+              <a:extLst>
+                <a:ext uri="{FF2B5EF4-FFF2-40B4-BE49-F238E27FC236}">
+                  <a16:creationId xmlns:a16="http://schemas.microsoft.com/office/drawing/2014/main" id="{0EFE8AB9-C901-D587-26CA-192E0897B099}"/>
+                </a:ext>
+              </a:extLst>
+            </p:cNvPr>
+            <p:cNvSpPr txBox="1"/>
+            <p:nvPr/>
+          </p:nvSpPr>
+          <p:spPr>
+            <a:xfrm>
+              <a:off x="11030189" y="2399304"/>
+              <a:ext cx="877164" cy="590931"/>
+            </a:xfrm>
+            <a:prstGeom prst="rect">
+              <a:avLst/>
+            </a:prstGeom>
+            <a:noFill/>
+          </p:spPr>
+          <p:txBody>
+            <a:bodyPr wrap="none" rtlCol="0">
+              <a:spAutoFit/>
+            </a:bodyPr>
+            <a:lstStyle/>
+            <a:p>
+              <a:pPr algn="ctr">
+                <a:lnSpc>
+                  <a:spcPct val="90000"/>
+                </a:lnSpc>
+              </a:pPr>
+              <a:r>
+                <a:rPr lang="en-US" dirty="0"/>
+                <a:t>Todd</a:t>
+              </a:r>
+            </a:p>
+            <a:p>
+              <a:pPr algn="ctr">
+                <a:lnSpc>
+                  <a:spcPct val="90000"/>
+                </a:lnSpc>
+              </a:pPr>
+              <a:r>
+                <a:rPr lang="en-US" i="1" dirty="0"/>
+                <a:t>he/him</a:t>
+              </a:r>
+            </a:p>
+          </p:txBody>
+        </p:sp>
       </p:grpSp>
     </p:spTree>
     <p:extLst>
@@ -7987,9 +9027,12 @@
 </file>
 
 <file path=customXml/item1.xml><?xml version="1.0" encoding="utf-8"?>
-<p:properties xmlns:p="http://schemas.microsoft.com/office/2006/metadata/properties" xmlns:xsi="http://www.w3.org/2001/XMLSchema-instance" xmlns:pc="http://schemas.microsoft.com/office/infopath/2007/PartnerControls">
-  <documentManagement/>
-</p:properties>
+<?mso-contentType ?>
+<FormTemplates xmlns="http://schemas.microsoft.com/sharepoint/v3/contenttype/forms">
+  <Display>DocumentLibraryForm</Display>
+  <Edit>DocumentLibraryForm</Edit>
+  <New>DocumentLibraryForm</New>
+</FormTemplates>
 </file>
 
 <file path=customXml/item2.xml><?xml version="1.0" encoding="utf-8"?>
@@ -8042,25 +9085,15 @@
 </file>
 
 <file path=customXml/item3.xml><?xml version="1.0" encoding="utf-8"?>
-<?mso-contentType ?>
-<FormTemplates xmlns="http://schemas.microsoft.com/sharepoint/v3/contenttype/forms">
-  <Display>DocumentLibraryForm</Display>
-  <Edit>DocumentLibraryForm</Edit>
-  <New>DocumentLibraryForm</New>
-</FormTemplates>
+<p:properties xmlns:p="http://schemas.microsoft.com/office/2006/metadata/properties" xmlns:xsi="http://www.w3.org/2001/XMLSchema-instance" xmlns:pc="http://schemas.microsoft.com/office/infopath/2007/PartnerControls">
+  <documentManagement/>
+</p:properties>
 </file>
 
 <file path=customXml/itemProps1.xml><?xml version="1.0" encoding="utf-8"?>
-<ds:datastoreItem xmlns:ds="http://schemas.openxmlformats.org/officeDocument/2006/customXml" ds:itemID="{A50EC660-24D0-43A0-AE5E-E274115E726B}">
+<ds:datastoreItem xmlns:ds="http://schemas.openxmlformats.org/officeDocument/2006/customXml" ds:itemID="{19E20559-B232-4371-8690-E3D8007EDB82}">
   <ds:schemaRefs>
-    <ds:schemaRef ds:uri="http://purl.org/dc/elements/1.1/"/>
-    <ds:schemaRef ds:uri="http://schemas.microsoft.com/office/2006/metadata/properties"/>
-    <ds:schemaRef ds:uri="http://purl.org/dc/terms/"/>
-    <ds:schemaRef ds:uri="http://schemas.openxmlformats.org/package/2006/metadata/core-properties"/>
-    <ds:schemaRef ds:uri="http://schemas.microsoft.com/office/2006/documentManagement/types"/>
-    <ds:schemaRef ds:uri="http://www.w3.org/XML/1998/namespace"/>
-    <ds:schemaRef ds:uri="http://purl.org/dc/dcmitype/"/>
-    <ds:schemaRef ds:uri="http://schemas.microsoft.com/office/infopath/2007/PartnerControls"/>
+    <ds:schemaRef ds:uri="http://schemas.microsoft.com/sharepoint/v3/contenttype/forms"/>
   </ds:schemaRefs>
 </ds:datastoreItem>
 </file>
@@ -8081,9 +9114,16 @@
 </file>
 
 <file path=customXml/itemProps3.xml><?xml version="1.0" encoding="utf-8"?>
-<ds:datastoreItem xmlns:ds="http://schemas.openxmlformats.org/officeDocument/2006/customXml" ds:itemID="{19E20559-B232-4371-8690-E3D8007EDB82}">
+<ds:datastoreItem xmlns:ds="http://schemas.openxmlformats.org/officeDocument/2006/customXml" ds:itemID="{A50EC660-24D0-43A0-AE5E-E274115E726B}">
   <ds:schemaRefs>
-    <ds:schemaRef ds:uri="http://schemas.microsoft.com/sharepoint/v3/contenttype/forms"/>
+    <ds:schemaRef ds:uri="http://purl.org/dc/elements/1.1/"/>
+    <ds:schemaRef ds:uri="http://schemas.microsoft.com/office/2006/metadata/properties"/>
+    <ds:schemaRef ds:uri="http://purl.org/dc/terms/"/>
+    <ds:schemaRef ds:uri="http://schemas.openxmlformats.org/package/2006/metadata/core-properties"/>
+    <ds:schemaRef ds:uri="http://schemas.microsoft.com/office/2006/documentManagement/types"/>
+    <ds:schemaRef ds:uri="http://www.w3.org/XML/1998/namespace"/>
+    <ds:schemaRef ds:uri="http://purl.org/dc/dcmitype/"/>
+    <ds:schemaRef ds:uri="http://schemas.microsoft.com/office/infopath/2007/PartnerControls"/>
   </ds:schemaRefs>
 </ds:datastoreItem>
 </file>
</xml_diff>

<commit_message>
Updates for title/license slides for ATPESC
</commit_message>
<xml_diff>
--- a/intro-a.pptx
+++ b/intro-a.pptx
@@ -12,7 +12,7 @@
   </p:handoutMasterIdLst>
   <p:sldIdLst>
     <p:sldId id="617" r:id="rId5"/>
-    <p:sldId id="623" r:id="rId6"/>
+    <p:sldId id="320" r:id="rId6"/>
     <p:sldId id="308" r:id="rId7"/>
     <p:sldId id="324" r:id="rId8"/>
     <p:sldId id="329" r:id="rId9"/>
@@ -5843,16 +5843,16 @@
             </a:r>
             <a:r>
               <a:rPr lang="en-US" sz="1600" dirty="0"/>
-              <a:t>Anshu Dubey and Gregory R. Watson, Software Practices for Reproducible Science tutorial, in 2024 ACM Conference on Reproducibility and Replicability (ACM-REP), Rennes, France and online, 2024. DOI: </a:t>
+              <a:t>Anshu Dubey, David E. Bernholdt, Todd Gamblin, and Jared O’Neal, Software Productivity and Sustainability track, in Argonne Training Program on Extreme-Scale Computing, St. Charles, Illinois, 2024. DOI: </a:t>
             </a:r>
             <a:r>
               <a:rPr lang="en-US" sz="1600" dirty="0">
                 <a:hlinkClick r:id="rId4"/>
               </a:rPr>
-              <a:t>10.6084/m9.figshare.26019469</a:t>
-            </a:r>
-            <a:r>
-              <a:rPr lang="en-US" sz="1600" b="1" dirty="0"/>
+              <a:t>10.6084/m9.figshare.26384188</a:t>
+            </a:r>
+            <a:r>
+              <a:rPr lang="en-US" sz="1600" dirty="0"/>
               <a:t>.</a:t>
             </a:r>
             <a:endParaRPr lang="en-US" sz="1600" b="0" i="0" dirty="0">
@@ -6044,7 +6044,7 @@
     </p:spTree>
     <p:extLst>
       <p:ext uri="{BB962C8B-B14F-4D97-AF65-F5344CB8AC3E}">
-        <p14:creationId xmlns:p14="http://schemas.microsoft.com/office/powerpoint/2010/main" val="978726433"/>
+        <p14:creationId xmlns:p14="http://schemas.microsoft.com/office/powerpoint/2010/main" val="3013410495"/>
       </p:ext>
     </p:extLst>
   </p:cSld>
@@ -9027,15 +9027,6 @@
 </file>
 
 <file path=customXml/item1.xml><?xml version="1.0" encoding="utf-8"?>
-<?mso-contentType ?>
-<FormTemplates xmlns="http://schemas.microsoft.com/sharepoint/v3/contenttype/forms">
-  <Display>DocumentLibraryForm</Display>
-  <Edit>DocumentLibraryForm</Edit>
-  <New>DocumentLibraryForm</New>
-</FormTemplates>
-</file>
-
-<file path=customXml/item2.xml><?xml version="1.0" encoding="utf-8"?>
 <ct:contentTypeSchema xmlns:ct="http://schemas.microsoft.com/office/2006/metadata/contentType" xmlns:ma="http://schemas.microsoft.com/office/2006/metadata/properties/metaAttributes" ct:_="" ma:_="" ma:contentTypeName="Document" ma:contentTypeID="0x010100565464437F680748A68B85EB6594EA7D" ma:contentTypeVersion="0" ma:contentTypeDescription="Create a new document." ma:contentTypeScope="" ma:versionID="fe3f4dd58d5914c51cfc6deaa8ad845c">
   <xsd:schema xmlns:xsd="http://www.w3.org/2001/XMLSchema" xmlns:p="http://schemas.microsoft.com/office/2006/metadata/properties" targetNamespace="http://schemas.microsoft.com/office/2006/metadata/properties" ma:root="true" ma:fieldsID="4aeb20c0e3442673af7ee10786458764">
     <xsd:element name="properties">
@@ -9084,6 +9075,15 @@
 </ct:contentTypeSchema>
 </file>
 
+<file path=customXml/item2.xml><?xml version="1.0" encoding="utf-8"?>
+<?mso-contentType ?>
+<FormTemplates xmlns="http://schemas.microsoft.com/sharepoint/v3/contenttype/forms">
+  <Display>DocumentLibraryForm</Display>
+  <Edit>DocumentLibraryForm</Edit>
+  <New>DocumentLibraryForm</New>
+</FormTemplates>
+</file>
+
 <file path=customXml/item3.xml><?xml version="1.0" encoding="utf-8"?>
 <p:properties xmlns:p="http://schemas.microsoft.com/office/2006/metadata/properties" xmlns:xsi="http://www.w3.org/2001/XMLSchema-instance" xmlns:pc="http://schemas.microsoft.com/office/infopath/2007/PartnerControls">
   <documentManagement/>
@@ -9091,14 +9091,6 @@
 </file>
 
 <file path=customXml/itemProps1.xml><?xml version="1.0" encoding="utf-8"?>
-<ds:datastoreItem xmlns:ds="http://schemas.openxmlformats.org/officeDocument/2006/customXml" ds:itemID="{19E20559-B232-4371-8690-E3D8007EDB82}">
-  <ds:schemaRefs>
-    <ds:schemaRef ds:uri="http://schemas.microsoft.com/sharepoint/v3/contenttype/forms"/>
-  </ds:schemaRefs>
-</ds:datastoreItem>
-</file>
-
-<file path=customXml/itemProps2.xml><?xml version="1.0" encoding="utf-8"?>
 <ds:datastoreItem xmlns:ds="http://schemas.openxmlformats.org/officeDocument/2006/customXml" ds:itemID="{E8DB7DEB-074E-4EE8-9B6E-FD277323109C}">
   <ds:schemaRefs>
     <ds:schemaRef ds:uri="http://schemas.microsoft.com/office/2006/metadata/contentType"/>
@@ -9109,6 +9101,14 @@
     <ds:schemaRef ds:uri="http://purl.org/dc/elements/1.1/"/>
     <ds:schemaRef ds:uri="http://purl.org/dc/terms/"/>
     <ds:schemaRef ds:uri="http://schemas.microsoft.com/office/internal/2005/internalDocumentation"/>
+  </ds:schemaRefs>
+</ds:datastoreItem>
+</file>
+
+<file path=customXml/itemProps2.xml><?xml version="1.0" encoding="utf-8"?>
+<ds:datastoreItem xmlns:ds="http://schemas.openxmlformats.org/officeDocument/2006/customXml" ds:itemID="{19E20559-B232-4371-8690-E3D8007EDB82}">
+  <ds:schemaRefs>
+    <ds:schemaRef ds:uri="http://schemas.microsoft.com/sharepoint/v3/contenttype/forms"/>
   </ds:schemaRefs>
 </ds:datastoreItem>
 </file>

</xml_diff>

<commit_message>
Updates to About Us slide
</commit_message>
<xml_diff>
--- a/intro-a.pptx
+++ b/intro-a.pptx
@@ -6194,7 +6194,7 @@
         <p:spPr>
           <a:xfrm>
             <a:off x="453256" y="3373816"/>
-            <a:ext cx="10123321" cy="2708434"/>
+            <a:ext cx="10123321" cy="3016210"/>
           </a:xfrm>
           <a:prstGeom prst="rect">
             <a:avLst/>
@@ -6209,7 +6209,7 @@
           <a:p>
             <a:pPr marL="227013" indent="-227013">
               <a:spcBef>
-                <a:spcPts val="1800"/>
+                <a:spcPts val="600"/>
               </a:spcBef>
               <a:buFont typeface="Arial" panose="020B0604020202020204" pitchFamily="34" charset="0"/>
               <a:buChar char="•"/>
@@ -6229,7 +6229,7 @@
           <a:p>
             <a:pPr marL="227013" indent="-227013">
               <a:spcBef>
-                <a:spcPts val="1800"/>
+                <a:spcPts val="600"/>
               </a:spcBef>
               <a:buFont typeface="Arial" panose="020B0604020202020204" pitchFamily="34" charset="0"/>
               <a:buChar char="•"/>
@@ -6249,7 +6249,7 @@
           <a:p>
             <a:pPr marL="227013" indent="-227013">
               <a:spcBef>
-                <a:spcPts val="1800"/>
+                <a:spcPts val="600"/>
               </a:spcBef>
               <a:buFont typeface="Arial" panose="020B0604020202020204" pitchFamily="34" charset="0"/>
               <a:buChar char="•"/>
@@ -6272,7 +6272,7 @@
           <a:p>
             <a:pPr marL="227013" indent="-227013">
               <a:spcBef>
-                <a:spcPts val="1800"/>
+                <a:spcPts val="600"/>
               </a:spcBef>
               <a:buFont typeface="Arial" panose="020B0604020202020204" pitchFamily="34" charset="0"/>
               <a:buChar char="•"/>
@@ -6296,13 +6296,34 @@
             </a:r>
             <a:r>
               <a:rPr lang="en-US" sz="2000" dirty="0"/>
-              <a:t> RAPIDS Institute, fusion energy sciences projects, </a:t>
-            </a:r>
-            <a:r>
-              <a:rPr lang="en-US" sz="2000"/>
-              <a:t>and others</a:t>
-            </a:r>
-            <a:endParaRPr lang="en-US" sz="2000" dirty="0"/>
+              <a:t>: RAPIDS Institute, fusion energy sciences, nuclear physics</a:t>
+            </a:r>
+          </a:p>
+          <a:p>
+            <a:pPr marL="684213" lvl="1" indent="-227013">
+              <a:spcBef>
+                <a:spcPts val="600"/>
+              </a:spcBef>
+              <a:buFont typeface="Arial" panose="020B0604020202020204" pitchFamily="34" charset="0"/>
+              <a:buChar char="•"/>
+            </a:pPr>
+            <a:r>
+              <a:rPr lang="en-US" sz="2000" dirty="0"/>
+              <a:t>NSF Cyberinfrastructure for Sustained Scientific Innovation (CSSI) program</a:t>
+            </a:r>
+          </a:p>
+          <a:p>
+            <a:pPr marL="684213" lvl="1" indent="-227013">
+              <a:spcBef>
+                <a:spcPts val="600"/>
+              </a:spcBef>
+              <a:buFont typeface="Arial" panose="020B0604020202020204" pitchFamily="34" charset="0"/>
+              <a:buChar char="•"/>
+            </a:pPr>
+            <a:r>
+              <a:rPr lang="en-US" sz="2000" dirty="0"/>
+              <a:t>And more!</a:t>
+            </a:r>
           </a:p>
         </p:txBody>
       </p:sp>
@@ -9027,6 +9048,15 @@
 </file>
 
 <file path=customXml/item1.xml><?xml version="1.0" encoding="utf-8"?>
+<?mso-contentType ?>
+<FormTemplates xmlns="http://schemas.microsoft.com/sharepoint/v3/contenttype/forms">
+  <Display>DocumentLibraryForm</Display>
+  <Edit>DocumentLibraryForm</Edit>
+  <New>DocumentLibraryForm</New>
+</FormTemplates>
+</file>
+
+<file path=customXml/item2.xml><?xml version="1.0" encoding="utf-8"?>
 <ct:contentTypeSchema xmlns:ct="http://schemas.microsoft.com/office/2006/metadata/contentType" xmlns:ma="http://schemas.microsoft.com/office/2006/metadata/properties/metaAttributes" ct:_="" ma:_="" ma:contentTypeName="Document" ma:contentTypeID="0x010100565464437F680748A68B85EB6594EA7D" ma:contentTypeVersion="0" ma:contentTypeDescription="Create a new document." ma:contentTypeScope="" ma:versionID="fe3f4dd58d5914c51cfc6deaa8ad845c">
   <xsd:schema xmlns:xsd="http://www.w3.org/2001/XMLSchema" xmlns:p="http://schemas.microsoft.com/office/2006/metadata/properties" targetNamespace="http://schemas.microsoft.com/office/2006/metadata/properties" ma:root="true" ma:fieldsID="4aeb20c0e3442673af7ee10786458764">
     <xsd:element name="properties">
@@ -9075,15 +9105,6 @@
 </ct:contentTypeSchema>
 </file>
 
-<file path=customXml/item2.xml><?xml version="1.0" encoding="utf-8"?>
-<?mso-contentType ?>
-<FormTemplates xmlns="http://schemas.microsoft.com/sharepoint/v3/contenttype/forms">
-  <Display>DocumentLibraryForm</Display>
-  <Edit>DocumentLibraryForm</Edit>
-  <New>DocumentLibraryForm</New>
-</FormTemplates>
-</file>
-
 <file path=customXml/item3.xml><?xml version="1.0" encoding="utf-8"?>
 <p:properties xmlns:p="http://schemas.microsoft.com/office/2006/metadata/properties" xmlns:xsi="http://www.w3.org/2001/XMLSchema-instance" xmlns:pc="http://schemas.microsoft.com/office/infopath/2007/PartnerControls">
   <documentManagement/>
@@ -9091,6 +9112,14 @@
 </file>
 
 <file path=customXml/itemProps1.xml><?xml version="1.0" encoding="utf-8"?>
+<ds:datastoreItem xmlns:ds="http://schemas.openxmlformats.org/officeDocument/2006/customXml" ds:itemID="{19E20559-B232-4371-8690-E3D8007EDB82}">
+  <ds:schemaRefs>
+    <ds:schemaRef ds:uri="http://schemas.microsoft.com/sharepoint/v3/contenttype/forms"/>
+  </ds:schemaRefs>
+</ds:datastoreItem>
+</file>
+
+<file path=customXml/itemProps2.xml><?xml version="1.0" encoding="utf-8"?>
 <ds:datastoreItem xmlns:ds="http://schemas.openxmlformats.org/officeDocument/2006/customXml" ds:itemID="{E8DB7DEB-074E-4EE8-9B6E-FD277323109C}">
   <ds:schemaRefs>
     <ds:schemaRef ds:uri="http://schemas.microsoft.com/office/2006/metadata/contentType"/>
@@ -9101,14 +9130,6 @@
     <ds:schemaRef ds:uri="http://purl.org/dc/elements/1.1/"/>
     <ds:schemaRef ds:uri="http://purl.org/dc/terms/"/>
     <ds:schemaRef ds:uri="http://schemas.microsoft.com/office/internal/2005/internalDocumentation"/>
-  </ds:schemaRefs>
-</ds:datastoreItem>
-</file>
-
-<file path=customXml/itemProps2.xml><?xml version="1.0" encoding="utf-8"?>
-<ds:datastoreItem xmlns:ds="http://schemas.openxmlformats.org/officeDocument/2006/customXml" ds:itemID="{19E20559-B232-4371-8690-E3D8007EDB82}">
-  <ds:schemaRefs>
-    <ds:schemaRef ds:uri="http://schemas.microsoft.com/sharepoint/v3/contenttype/forms"/>
   </ds:schemaRefs>
 </ds:datastoreItem>
 </file>

</xml_diff>

<commit_message>
Update About Us page
</commit_message>
<xml_diff>
--- a/intro-a.pptx
+++ b/intro-a.pptx
@@ -265,7 +265,7 @@
           <a:p>
             <a:fld id="{0B842F42-2CE9-4E35-95C1-410DC08A50B1}" type="datetimeFigureOut">
               <a:rPr lang="en-US" smtClean="0"/>
-              <a:t>7/26/2024</a:t>
+              <a:t>7/28/2024</a:t>
             </a:fld>
             <a:endParaRPr lang="en-US"/>
           </a:p>
@@ -430,7 +430,7 @@
           <a:p>
             <a:fld id="{6F282904-F315-4730-8D91-37D99E141A6F}" type="datetimeFigureOut">
               <a:rPr lang="en-US" smtClean="0"/>
-              <a:t>7/26/2024</a:t>
+              <a:t>7/28/2024</a:t>
             </a:fld>
             <a:endParaRPr lang="en-US"/>
           </a:p>
@@ -6194,7 +6194,7 @@
         <p:spPr>
           <a:xfrm>
             <a:off x="453256" y="3373816"/>
-            <a:ext cx="10123321" cy="3016210"/>
+            <a:ext cx="10123321" cy="3400931"/>
           </a:xfrm>
           <a:prstGeom prst="rect">
             <a:avLst/>
@@ -6322,7 +6322,28 @@
             </a:pPr>
             <a:r>
               <a:rPr lang="en-US" sz="2000" dirty="0"/>
-              <a:t>And more!</a:t>
+              <a:t>Past: Exascale </a:t>
+            </a:r>
+            <a:r>
+              <a:rPr lang="en-US" sz="2000"/>
+              <a:t>Computing Project</a:t>
+            </a:r>
+          </a:p>
+          <a:p>
+            <a:pPr marL="684213" lvl="1" indent="-227013">
+              <a:spcBef>
+                <a:spcPts val="600"/>
+              </a:spcBef>
+              <a:buFont typeface="Arial" panose="020B0604020202020204" pitchFamily="34" charset="0"/>
+              <a:buChar char="•"/>
+            </a:pPr>
+            <a:r>
+              <a:rPr lang="en-US" sz="2000"/>
+              <a:t>And </a:t>
+            </a:r>
+            <a:r>
+              <a:rPr lang="en-US" sz="2000" dirty="0"/>
+              <a:t>more!</a:t>
             </a:r>
           </a:p>
         </p:txBody>
@@ -9048,15 +9069,6 @@
 </file>
 
 <file path=customXml/item1.xml><?xml version="1.0" encoding="utf-8"?>
-<?mso-contentType ?>
-<FormTemplates xmlns="http://schemas.microsoft.com/sharepoint/v3/contenttype/forms">
-  <Display>DocumentLibraryForm</Display>
-  <Edit>DocumentLibraryForm</Edit>
-  <New>DocumentLibraryForm</New>
-</FormTemplates>
-</file>
-
-<file path=customXml/item2.xml><?xml version="1.0" encoding="utf-8"?>
 <ct:contentTypeSchema xmlns:ct="http://schemas.microsoft.com/office/2006/metadata/contentType" xmlns:ma="http://schemas.microsoft.com/office/2006/metadata/properties/metaAttributes" ct:_="" ma:_="" ma:contentTypeName="Document" ma:contentTypeID="0x010100565464437F680748A68B85EB6594EA7D" ma:contentTypeVersion="0" ma:contentTypeDescription="Create a new document." ma:contentTypeScope="" ma:versionID="fe3f4dd58d5914c51cfc6deaa8ad845c">
   <xsd:schema xmlns:xsd="http://www.w3.org/2001/XMLSchema" xmlns:p="http://schemas.microsoft.com/office/2006/metadata/properties" targetNamespace="http://schemas.microsoft.com/office/2006/metadata/properties" ma:root="true" ma:fieldsID="4aeb20c0e3442673af7ee10786458764">
     <xsd:element name="properties">
@@ -9105,6 +9117,15 @@
 </ct:contentTypeSchema>
 </file>
 
+<file path=customXml/item2.xml><?xml version="1.0" encoding="utf-8"?>
+<?mso-contentType ?>
+<FormTemplates xmlns="http://schemas.microsoft.com/sharepoint/v3/contenttype/forms">
+  <Display>DocumentLibraryForm</Display>
+  <Edit>DocumentLibraryForm</Edit>
+  <New>DocumentLibraryForm</New>
+</FormTemplates>
+</file>
+
 <file path=customXml/item3.xml><?xml version="1.0" encoding="utf-8"?>
 <p:properties xmlns:p="http://schemas.microsoft.com/office/2006/metadata/properties" xmlns:xsi="http://www.w3.org/2001/XMLSchema-instance" xmlns:pc="http://schemas.microsoft.com/office/infopath/2007/PartnerControls">
   <documentManagement/>
@@ -9112,14 +9133,6 @@
 </file>
 
 <file path=customXml/itemProps1.xml><?xml version="1.0" encoding="utf-8"?>
-<ds:datastoreItem xmlns:ds="http://schemas.openxmlformats.org/officeDocument/2006/customXml" ds:itemID="{19E20559-B232-4371-8690-E3D8007EDB82}">
-  <ds:schemaRefs>
-    <ds:schemaRef ds:uri="http://schemas.microsoft.com/sharepoint/v3/contenttype/forms"/>
-  </ds:schemaRefs>
-</ds:datastoreItem>
-</file>
-
-<file path=customXml/itemProps2.xml><?xml version="1.0" encoding="utf-8"?>
 <ds:datastoreItem xmlns:ds="http://schemas.openxmlformats.org/officeDocument/2006/customXml" ds:itemID="{E8DB7DEB-074E-4EE8-9B6E-FD277323109C}">
   <ds:schemaRefs>
     <ds:schemaRef ds:uri="http://schemas.microsoft.com/office/2006/metadata/contentType"/>
@@ -9130,6 +9143,14 @@
     <ds:schemaRef ds:uri="http://purl.org/dc/elements/1.1/"/>
     <ds:schemaRef ds:uri="http://purl.org/dc/terms/"/>
     <ds:schemaRef ds:uri="http://schemas.microsoft.com/office/internal/2005/internalDocumentation"/>
+  </ds:schemaRefs>
+</ds:datastoreItem>
+</file>
+
+<file path=customXml/itemProps2.xml><?xml version="1.0" encoding="utf-8"?>
+<ds:datastoreItem xmlns:ds="http://schemas.openxmlformats.org/officeDocument/2006/customXml" ds:itemID="{19E20559-B232-4371-8690-E3D8007EDB82}">
+  <ds:schemaRefs>
+    <ds:schemaRef ds:uri="http://schemas.microsoft.com/sharepoint/v3/contenttype/forms"/>
   </ds:schemaRefs>
 </ds:datastoreItem>
 </file>

</xml_diff>